<commit_message>
Copy Files From Source Repo (2024-07-19 18:35)
</commit_message>
<xml_diff>
--- a/ResourceFiles/Mystic Spice Premium Chai Market Analysis Presentation.pptx
+++ b/ResourceFiles/Mystic Spice Premium Chai Market Analysis Presentation.pptx
@@ -524,7 +524,7 @@
                 <a:ea typeface="Batang"/>
                 <a:cs typeface="Batang"/>
               </a:rPr>
-              <a:t>이 프레젠테이션은 이 문서에 있는 콘텐츠를 기반으로 PowerPoint Copilot에 의해 자동으로 생성되었습니다.</a:t>
+              <a:t>이 프레젠테이션은 다음 문서에 있는 콘텐츠를 기반으로 PowerPoint Copilot에 의해 자동으로 생성되었습니다.</a:t>
             </a:r>
             <a:r>
               <a:rPr sz="1200"/>
@@ -541,7 +541,7 @@
                 <a:ea typeface="Batang"/>
                 <a:cs typeface="Batang"/>
               </a:rPr>
-              <a:t> HTTPS://MICROSOFT-MY.SHAREPOINT.COM/PERSONAL/DAHANS_MICROSOFT_COM/DOCUMENTS/MS-4005/MARKET%20ANALYSIS%20REPORT%20FOR%20MYSTIC%20SPICE%20PREMIUM%20CHAI%20TEA.DOCX</a:t>
+              <a:t>https://microsoft-my.sharepoint.com/personal/dahans_microsoft_com/Documents/MS-4005/Market%20Analysis%20Report%20for%20Mystic%20Spice%20Premium%20Chai%20Tea.docx</a:t>
             </a:r>
             <a:r>
               <a:rPr sz="1200"/>
@@ -685,7 +685,7 @@
                 <a:ea typeface="Batang"/>
                 <a:cs typeface="Batang"/>
               </a:rPr>
-              <a:t>라틴 아메리카의 주요 유통업체로는 유니레버, 네슬레, 코카콜라, 펩시코 등이 있습니다.</a:t>
+              <a:t>라틴 아메리카의 주요 유통업체로는 Unilever, Nestle, Coca-Cola, PepsiCo 등이 있습니다.</a:t>
             </a:r>
             <a:r>
               <a:rPr sz="1200"/>
@@ -741,7 +741,7 @@
                 <a:ea typeface="Batang"/>
                 <a:cs typeface="Batang"/>
               </a:rPr>
-              <a:t>유통업체는 제조업체 또는 도매업체를 대신하여 Chai 차 제품을 대표하고 배포하는 기업입니다. </a:t>
+              <a:t>유통업체는 제조업체나 도매업체를 대신하여 차이 티 제품을 소개 및 유통하는 기업입니다. </a:t>
             </a:r>
             <a:r>
               <a:rPr lang="ko-KR" sz="1200" b="0" i="0" strike="noStrike" cap="none" baseline="0">
@@ -778,6 +778,11 @@
                 <a:cs typeface="Batang"/>
               </a:rPr>
               <a:t>라틴 아메리카 지역의 주요 차이 티 제품 유통업체로는 Unilever, Nestle, Coca-Cola, PepsiCo 등이 있습니다.</a:t>
+            </a:r>
+            <a:r>
+              <a:rPr sz="1200"/>
+              <a:t>
+</a:t>
             </a:r>
           </a:p>
         </p:txBody>
@@ -894,7 +899,7 @@
                 <a:ea typeface="Batang"/>
                 <a:cs typeface="Batang"/>
               </a:rPr>
-              <a:t>이 계획은 $100,000의 예산으로 12개월 이상 구현되고 주요 성과 지표를 사용하여 평가됩니다.</a:t>
+              <a:t>이 계획은 $100,000의 예산으로 12개월 이상 구현되고 핵심 성과 지표를 사용하여 평가됩니다.</a:t>
             </a:r>
             <a:r>
               <a:rPr sz="1200"/>
@@ -933,7 +938,7 @@
                 <a:ea typeface="Batang"/>
                 <a:cs typeface="Batang"/>
               </a:rPr>
-              <a:t>오리지널 콘텐츠:</a:t>
+              <a:t>원본 콘텐츠:</a:t>
             </a:r>
             <a:r>
               <a:rPr sz="1200"/>
@@ -967,7 +972,7 @@
                 <a:ea typeface="Batang"/>
                 <a:cs typeface="Batang"/>
               </a:rPr>
-              <a:t>라틴 아메리카의 차이차 프로모션 계획 및 전략은 다음 목표를 달성하는 것을 목표로 합니다.</a:t>
+              <a:t>라틴 아메리카의 차이 티 프로모션 계획 및 전략은 다음 목표를 달성하는 것을 목표로 합니다.</a:t>
             </a:r>
             <a:r>
               <a:rPr sz="1200"/>
@@ -984,7 +989,7 @@
                 <a:ea typeface="Batang"/>
                 <a:cs typeface="Batang"/>
               </a:rPr>
-              <a:t>·         타겟 고객</a:t>
+              <a:t>·       대상 고객들 사이에서 차이 티에 대한 인지도와 관심 높이기</a:t>
             </a:r>
             <a:r>
               <a:rPr sz="1200"/>
@@ -1001,7 +1006,7 @@
                 <a:ea typeface="Batang"/>
                 <a:cs typeface="Batang"/>
               </a:rPr>
-              <a:t>들 사이에서 차이차에 대한 인지도와 관심을 높입니다.         차이차를 독특하고 만족스러운 경험을</a:t>
+              <a:t>         차이 티를 독특하고 만족스러운 경험을 제공하는 프리미엄, 천연 및 건강 제품으로 자리매김하기</a:t>
             </a:r>
             <a:r>
               <a:rPr sz="1200"/>
@@ -1018,7 +1023,7 @@
                 <a:ea typeface="Batang"/>
                 <a:cs typeface="Batang"/>
               </a:rPr>
-              <a:t> 제공하는 프리미엄, 천연 및 건강한 제품으로 자리 잡고 있습니다.         다양한 채널과 인센티브를 통해 Chai 차의 평가판 및 구매를 장려합니다</a:t>
+              <a:t>         다양한 채널과 인센티브를 통해 차이 티의 체험 및 구매 장려</a:t>
             </a:r>
             <a:r>
               <a:rPr sz="1200"/>
@@ -1035,7 +1040,7 @@
                 <a:ea typeface="Batang"/>
                 <a:cs typeface="Batang"/>
               </a:rPr>
-              <a:t>.         참여와 피드백을</a:t>
+              <a:t>.        참여와 피드백을 통해 차이 티 소비자들 사이에서 충성도와 재방문 주기 구축</a:t>
             </a:r>
             <a:r>
               <a:rPr sz="1200"/>
@@ -1052,7 +1057,7 @@
                 <a:ea typeface="Batang"/>
                 <a:cs typeface="Batang"/>
               </a:rPr>
-              <a:t>통해 차이차 소비자들 사이에서 충성도와 보존을 구축합니다. 라틴 아메리카의 차이차에 대한 프로모션 계획과 전략은 다음과 같은 전술의 조합을 사용합니다.</a:t>
+              <a:t>라틴 아메리카의 차이 티에 대한 프로모션 계획과 전략은 다음과 같은 전술의 조합을 사용합니다.</a:t>
             </a:r>
             <a:r>
               <a:rPr sz="1200"/>
@@ -1069,7 +1074,7 @@
                 <a:ea typeface="Batang"/>
                 <a:cs typeface="Batang"/>
               </a:rPr>
-              <a:t>·         차이차</a:t>
+              <a:t>·         차이 티에 대한 쉽게 기억할 수 있고 기억에 남는 브랜드 이름과 로고 만들기</a:t>
             </a:r>
             <a:r>
               <a:rPr sz="1200"/>
@@ -1086,7 +1091,7 @@
                 <a:ea typeface="Batang"/>
                 <a:cs typeface="Batang"/>
               </a:rPr>
-              <a:t>에 대한 인기 있고 기억에 남는 브랜드 이름과 로고 만들기         차이차의 이점, 특징, 스토리를</a:t>
+              <a:t>         차이 티의 이점, 특징, 스토리를 보여주는 웹사이트와 소셜 미디어 사이트 개발</a:t>
             </a:r>
             <a:r>
               <a:rPr sz="1200"/>
@@ -1103,7 +1108,7 @@
                 <a:ea typeface="Batang"/>
                 <a:cs typeface="Batang"/>
               </a:rPr>
-              <a:t> 보여주는 웹사이트와 소셜 미디어 존재 개발         SEO, SEM, 이메일 마케팅 및 인플루언서 마케팅을 사용하여 잠재 고객에게</a:t>
+              <a:t>         SEO, SEM, 이메일 마케팅 및 인플루언서 마케팅을 사용하여 잠재 고객에게 도달하고 유치하는 디지털 마케팅 캠페인 시작</a:t>
             </a:r>
             <a:r>
               <a:rPr sz="1200"/>
@@ -1120,7 +1125,7 @@
                 <a:ea typeface="Batang"/>
                 <a:cs typeface="Batang"/>
               </a:rPr>
-              <a:t> 도달하고 유치하는 디지털 마케팅 캠페인 시작         슈퍼마켓, 카페, 헬스 스토어</a:t>
+              <a:t>          슈퍼마켓, 카페, 헬스 스토어 등 전략적 위치에 차이 티 무료 샘플 및 쿠폰 배포</a:t>
             </a:r>
             <a:r>
               <a:rPr sz="1200"/>
@@ -1137,7 +1142,7 @@
                 <a:ea typeface="Batang"/>
                 <a:cs typeface="Batang"/>
               </a:rPr>
-              <a:t> 등 전략적 위치에 차이차 무료 샘플 및 쿠폰 배포         사람들이 차이 차를 친구 및 가족과</a:t>
+              <a:t>         사람들이 차이 티를 친구 및 가족과 함께 공유하도록 초대하는 이벤트 및 콘테스트 유치</a:t>
             </a:r>
             <a:r>
               <a:rPr sz="1200"/>
@@ -1154,7 +1159,7 @@
                 <a:ea typeface="Batang"/>
                 <a:cs typeface="Batang"/>
               </a:rPr>
-              <a:t> 함께 공유하도록 초대하는 이벤트 및 콘테스트 구성         Chai tea</a:t>
+              <a:t>        차이 티와 동일한 가치와 비전을 공유하는 지역 기업 및 조직과 협력하는</a:t>
             </a:r>
             <a:r>
               <a:rPr sz="1200"/>
@@ -1171,19 +1176,24 @@
                 <a:ea typeface="Batang"/>
                 <a:cs typeface="Batang"/>
               </a:rPr>
-              <a:t>와 동일한 가치와 비전을 공유하는 지역 기업 및 조직과 협력하여 라틴 아메리카의 Chai Tea에 대한 홍보 계획 및 전략은 12 개월 동안 구현되며 예산은 $ 100,000입니다. </a:t>
-            </a:r>
-            <a:r>
-              <a:rPr lang="ko-KR" sz="1200" b="0" i="0" strike="noStrike" cap="none" baseline="0">
-                <a:solidFill>
-                  <a:srgbClr val="000000"/>
-                </a:solidFill>
-                <a:effectLst/>
-                <a:latin typeface="Batang"/>
-                <a:ea typeface="Batang"/>
-                <a:cs typeface="Batang"/>
-              </a:rPr>
-              <a:t>웹 사이트 트래픽, 소셜 미디어 방문율, 이메일 확인율, 전환율, 판매량, 고객 만족도, 고객 유지율 등의 핵심 성과 지표를 사용하여 계획을 모니터링하고 평가할 예정입니다.</a:t>
+              <a:t> 라틴 아메리카의 차이 티에 대한 홍보 계획 및 전략은 12개월 동안 진행되며 예산은 $100,000입니다. </a:t>
+            </a:r>
+            <a:r>
+              <a:rPr lang="ko-KR" sz="1200" b="0" i="0" strike="noStrike" cap="none" baseline="0">
+                <a:solidFill>
+                  <a:srgbClr val="000000"/>
+                </a:solidFill>
+                <a:effectLst/>
+                <a:latin typeface="Batang"/>
+                <a:ea typeface="Batang"/>
+                <a:cs typeface="Batang"/>
+              </a:rPr>
+              <a:t>웹 사이트 트래픽, 소셜 미디어 참여도, 이메일 확인율, 전환율, 판매량, 고객 만족도, 고객 유지율 등의 핵심 성과 지표를 사용하여 계획을 모니터링하고 평가할 예정입니다.</a:t>
+            </a:r>
+            <a:r>
+              <a:rPr sz="1200"/>
+              <a:t>
+</a:t>
             </a:r>
           </a:p>
         </p:txBody>
@@ -1276,7 +1286,7 @@
                 <a:ea typeface="Batang"/>
                 <a:cs typeface="Batang"/>
               </a:rPr>
-              <a:t>라틴 아메리카의 Chai Tea에 대한 프로모션 계획 및 전략은 인지도와 관심이 20% 증가하고, 시장 점유율이 10% 증가하고, 판매량과 수익이 15% 증가하고, 고객 만족도와 보존률이 25% 증가할 것으로 예상됩니다.</a:t>
+              <a:t>라틴 아메리카의 차이 티에 대한 프로모션 계획 및 전략은 인지도와 관심이 20% 증가하고, 시장 점유율이 10% 증가하고, 판매량과 수익이 15% 증가하고, 고객 만족도와 보존률이 25% 증가할 것으로 예상됩니다.</a:t>
             </a:r>
             <a:r>
               <a:rPr sz="1200"/>
@@ -1366,7 +1376,7 @@
                 <a:ea typeface="Batang"/>
                 <a:cs typeface="Batang"/>
               </a:rPr>
-              <a:t>·         대상 고객</a:t>
+              <a:t>·        대상 고객 중 차이 티에 대한 인식과 관심 20% 증가</a:t>
             </a:r>
             <a:r>
               <a:rPr sz="1200"/>
@@ -1383,7 +1393,7 @@
                 <a:ea typeface="Batang"/>
                 <a:cs typeface="Batang"/>
               </a:rPr>
-              <a:t> 중 차이차에 대한 인식과 관심이 20% 증가했습니다.         이 지역의</a:t>
+              <a:t>         이 지역의 차이 티 시장 점유율 10% 증가</a:t>
             </a:r>
             <a:r>
               <a:rPr sz="1200"/>
@@ -1400,7 +1410,7 @@
                 <a:ea typeface="Batang"/>
                 <a:cs typeface="Batang"/>
               </a:rPr>
-              <a:t> 차이차 시장 점유율이 10% 증가했습니다.         이 지역의</a:t>
+              <a:t>.        이 지역의 차이 티 판매량과 매출 15% 증가</a:t>
             </a:r>
             <a:r>
               <a:rPr sz="1200"/>
@@ -1417,7 +1427,7 @@
                 <a:ea typeface="Batang"/>
                 <a:cs typeface="Batang"/>
               </a:rPr>
-              <a:t> 차이차 판매량과 매출이 15% 증가했습니다.         지역 내 차이차의 고객 만족도 및 보존율이 25% 증가</a:t>
+              <a:t>         지역 내 차이 티의 고객 만족도 및 보존율 25% 증가</a:t>
             </a:r>
             <a:r>
               <a:rPr sz="1200"/>
@@ -1515,7 +1525,7 @@
                 <a:ea typeface="Batang"/>
                 <a:cs typeface="Batang"/>
               </a:rPr>
-              <a:t>라틴 아메리카의 차이차에 대한 홍보 계획과 전략은 높은 가격, 인식 부족, 다른 차 제품의 경쟁, 규제 및 문화 장벽, 차이 차 재료의 공급과 품질에 영향을 미칠 수있는 환경 및 사회 문제를 포함하여 몇 가지 도전에 직면하고 있습니다.</a:t>
+              <a:t>라틴 아메리카의 차이 티에 대한 프로모션 계획과 전략은 높은 가격, 인식 부족, 다른 티 제품의 경쟁, 규제 및 문화 장벽, 차이 티 재료의 공급과 품질에 영향을 미칠 수있는 환경 및 사회 문제를 포함하여 몇 가지 도전 과제에 직면하고 있습니다.</a:t>
             </a:r>
             <a:r>
               <a:rPr sz="1200"/>
@@ -1554,7 +1564,7 @@
                 <a:ea typeface="Batang"/>
                 <a:cs typeface="Batang"/>
               </a:rPr>
-              <a:t>오리지널 콘텐츠:</a:t>
+              <a:t>원본 콘텐츠:</a:t>
             </a:r>
             <a:r>
               <a:rPr sz="1200"/>
@@ -1571,7 +1581,7 @@
                 <a:ea typeface="Batang"/>
                 <a:cs typeface="Batang"/>
               </a:rPr>
-              <a:t> 라틴 아메리카의 차이차 프로모션 계획과 전략의 잠재적 과제는 다음과 같습니다.</a:t>
+              <a:t>라틴 아메리카의 차이 티 프로모션 계획과 전략의 잠재적 과제는 다음과 같습니다.</a:t>
             </a:r>
             <a:r>
               <a:rPr sz="1200"/>
@@ -1588,7 +1598,7 @@
                 <a:ea typeface="Batang"/>
                 <a:cs typeface="Batang"/>
               </a:rPr>
-              <a:t>·         다른 음료</a:t>
+              <a:t>·         다른 음료에 비해 차이 티 제품의 높은 가격과 낮은 경제성</a:t>
             </a:r>
             <a:r>
               <a:rPr sz="1200"/>
@@ -1605,7 +1615,7 @@
                 <a:ea typeface="Batang"/>
                 <a:cs typeface="Batang"/>
               </a:rPr>
-              <a:t>에 비해 차이 차 제품의 높은 가격과 낮은 경제성·         인구의</a:t>
+              <a:t>·        일부 인구 구성원의 차이 티에 대한 인식과 친숙함의 부족</a:t>
             </a:r>
             <a:r>
               <a:rPr sz="1200"/>
@@ -1622,7 +1632,7 @@
                 <a:ea typeface="Batang"/>
                 <a:cs typeface="Batang"/>
               </a:rPr>
-              <a:t> 일부 세그먼트 중 차이 차에 대한 인식과 친숙함의 부족         허브, 그린, 홍차 등 다른 차</a:t>
+              <a:t>         허브, 그린, 홍차 등 다른 티 제품의 경쟁</a:t>
             </a:r>
             <a:r>
               <a:rPr sz="1200"/>
@@ -1639,7 +1649,7 @@
                 <a:ea typeface="Batang"/>
                 <a:cs typeface="Batang"/>
               </a:rPr>
-              <a:t> 제품의 경쟁         일부 국가에서</a:t>
+              <a:t>         일부 국가에서 차이 티 제품의 진입 및 확장을 제한할 수 있는 규제 및 문화적 장벽</a:t>
             </a:r>
             <a:r>
               <a:rPr sz="1200"/>
@@ -1656,7 +1666,7 @@
                 <a:ea typeface="Batang"/>
                 <a:cs typeface="Batang"/>
               </a:rPr>
-              <a:t> 차이 차 제품의 진입 및 확장을 제한할 수 있는 규제 및 문화적 장벽         차이 차 재료의 공급과 품질에 영향을 줄 수 있는 환경 및 사회적 문제</a:t>
+              <a:t>         차이 티 재료의 공급과 품질에 영향을 줄 수 있는 환경 및 사회적 문제</a:t>
             </a:r>
             <a:r>
               <a:rPr sz="1200"/>
@@ -1778,7 +1788,7 @@
                 <a:ea typeface="Batang"/>
                 <a:cs typeface="Batang"/>
               </a:rPr>
-              <a:t>온라인 및 오프라인 전술의 혼합은 대상 대상에 도달하고 도전을 극복하는 데 사용해야합니다.</a:t>
+              <a:t>대상 그룹에 도달하고 도전 과제를 극복하기 위해서는 온라인 및 오프라인 전술을 혼합하여 사용해야 합니다.</a:t>
             </a:r>
             <a:r>
               <a:rPr sz="1200"/>
@@ -1834,7 +1844,7 @@
                 <a:ea typeface="Batang"/>
                 <a:cs typeface="Batang"/>
               </a:rPr>
-              <a:t>시장 분석, 경쟁 분석, 배포 채널 및 프로모션 계획 및 전략에 따라 권장 사항 및 결론</a:t>
+              <a:t>권장 사항 및 결론</a:t>
             </a:r>
             <a:r>
               <a:rPr sz="1200"/>
@@ -1851,7 +1861,7 @@
                 <a:ea typeface="Batang"/>
                 <a:cs typeface="Batang"/>
               </a:rPr>
-              <a:t>은 라틴 아메리카의 차이 차의 미래를 위해 다음과 같은 권장 사항과 결론을 도출할 수 있습니다.</a:t>
+              <a:t>시장 분석, 경쟁 분석, 배포 채널 및 프로모션 계획 및 전략에 따라 라틴 아메리카의 차이 티의 미래를 위해 다음과 같은 권장 사항과 결론을 도출할 수 있습니다.</a:t>
             </a:r>
             <a:r>
               <a:rPr sz="1200"/>
@@ -1868,7 +1878,7 @@
                 <a:ea typeface="Batang"/>
                 <a:cs typeface="Batang"/>
               </a:rPr>
-              <a:t>·         차이 차는 다른 음료에 대한 건강하고 자연스럽고 이국적인 대안을 제공하므로 라틴 아메리카 시장에서 성장하고 성공할 수있는 유망한 제품입니다</a:t>
+              <a:t>·         차이 티는 다른 음료에 대한 건강하고 천연적인 이국적 대안을 제공하므로 라틴 아메리카 시장에서 성장하고 성공할 수있는 유망한 제품입니다.</a:t>
             </a:r>
             <a:r>
               <a:rPr sz="1200"/>
@@ -1885,7 +1895,7 @@
                 <a:ea typeface="Batang"/>
                 <a:cs typeface="Batang"/>
               </a:rPr>
-              <a:t>.         차이 차는 다양한 세그먼트와 행사에</a:t>
+              <a:t>.        차이 티는 다양한 세그먼트와 행사에 어필할 수있는 프리미엄, 정통 및 다양한 제품으로 자리매김하고 판매해야 합니다.</a:t>
             </a:r>
             <a:r>
               <a:rPr sz="1200"/>
@@ -1902,7 +1912,7 @@
                 <a:ea typeface="Batang"/>
                 <a:cs typeface="Batang"/>
               </a:rPr>
-              <a:t> 어필 할 수있는 프리미엄, 정통 및 다재 다능한 제품으로 위치하고 판매해야합니다.         차이차는 다른 차 제품과 차별화하기 위해 풍부한 아로마, 맛, 건강상의 이점과 같은 고유한 특징과 이점을 활용해야 합니다</a:t>
+              <a:t>         차이 티는 다른 티 제품과 차별화하기 위해 풍부한 아로마, 맛, 건강상의 이점과 같은 고유한 특징과 이점을 활용해야 합니다</a:t>
             </a:r>
             <a:r>
               <a:rPr sz="1200"/>
@@ -1919,7 +1929,7 @@
                 <a:ea typeface="Batang"/>
                 <a:cs typeface="Batang"/>
               </a:rPr>
-              <a:t>.         Chai tea는 온라인 및 오프라인 전술을 혼합하여 대상 대상에 도달하고 참여시키고 충성스럽고 만족스러운 고객 기반을</a:t>
+              <a:t>.        차이 티는 온라인 및 오프라인 전술을 혼합하여 대상 그룹에 도달하고 그들을 참여시키면서 충성스럽고 만족스러운 고객 기반을 만들어야 합니다.</a:t>
             </a:r>
             <a:r>
               <a:rPr sz="1200"/>
@@ -1936,7 +1946,7 @@
                 <a:ea typeface="Batang"/>
                 <a:cs typeface="Batang"/>
               </a:rPr>
-              <a:t> 만들어야 합니다.         차이 차는 가격, 인식, 경쟁, 규제 및 지속 가능성</a:t>
+              <a:t>          차이 티는 가격, 인식, 경쟁, 규제 및 지속 가능성과 같은 지역의 성장과 확장을 방해할 수 있는 도전 과제와 위협을 극복해야 합니다.</a:t>
             </a:r>
             <a:r>
               <a:rPr sz="1200"/>
@@ -1953,7 +1963,7 @@
                 <a:ea typeface="Batang"/>
                 <a:cs typeface="Batang"/>
               </a:rPr>
-              <a:t>과 같은 지역의 성장과 확장을 방해할 수 있는 도전과 위협을 극복해야 합니다. 결론적으로 차이 차는 라틴 아메리카 시장에서 많은 잠재력과 기회를 가지고 있지만 몇 가지 도전과 위험에 직면한 제품입니다. </a:t>
+              <a:t>결론적으로 차이 티는 라틴 아메리카 시장에서 많은 잠재력과 기회를 가지고 있지만 몇 가지 도전 과제와 위험에 직면한 제품입니다. </a:t>
             </a:r>
             <a:r>
               <a:rPr lang="ko-KR" sz="1200" b="0" i="0" strike="noStrike" cap="none" baseline="0">
@@ -1978,6 +1988,11 @@
                 <a:cs typeface="Batang"/>
               </a:rPr>
               <a:t>단, 계속해서 변화하는 시장 상황과 고객의 피드백에 따라 프로모션 계획과 전략을 지속적으로 모니터링, 평가 및 조정해야 합니다.</a:t>
+            </a:r>
+            <a:r>
+              <a:rPr sz="1200"/>
+              <a:t>
+</a:t>
             </a:r>
           </a:p>
         </p:txBody>
@@ -2070,7 +2085,7 @@
                 <a:ea typeface="Batang"/>
                 <a:cs typeface="Batang"/>
               </a:rPr>
-              <a:t>안건</a:t>
+              <a:t>어젠더</a:t>
             </a:r>
             <a:r>
               <a:rPr sz="1200"/>
@@ -2109,7 +2124,7 @@
                 <a:ea typeface="Batang"/>
                 <a:cs typeface="Batang"/>
               </a:rPr>
-              <a:t>* 제품 설명* 제품 설명</a:t>
+              <a:t>* 제품 설명</a:t>
             </a:r>
             <a:r>
               <a:rPr sz="1200"/>
@@ -2126,7 +2141,7 @@
                 <a:ea typeface="Batang"/>
                 <a:cs typeface="Batang"/>
               </a:rPr>
-              <a:t> (1/2)</a:t>
+              <a:t>* 제품 설명(1/2)</a:t>
             </a:r>
             <a:r>
               <a:rPr sz="1200"/>
@@ -2143,7 +2158,7 @@
                 <a:ea typeface="Batang"/>
                 <a:cs typeface="Batang"/>
               </a:rPr>
-              <a:t>* 제품 설명 (2/2)</a:t>
+              <a:t>* 제품 설명(2/2)</a:t>
             </a:r>
             <a:r>
               <a:rPr sz="1200"/>
@@ -2262,7 +2277,7 @@
                 <a:ea typeface="Batang"/>
                 <a:cs typeface="Batang"/>
               </a:rPr>
-              <a:t> * 라틴 아메리카</a:t>
+              <a:t>* 라틴 아메리카의 차이 티 시장 점유율</a:t>
             </a:r>
             <a:r>
               <a:rPr sz="1200"/>
@@ -2279,7 +2294,7 @@
                 <a:ea typeface="Batang"/>
                 <a:cs typeface="Batang"/>
               </a:rPr>
-              <a:t>의 차이 차 시장 점유율 * 유통 채널</a:t>
+              <a:t>*유통 채널</a:t>
             </a:r>
             <a:r>
               <a:rPr sz="1200"/>
@@ -2296,7 +2311,7 @@
                 <a:ea typeface="Batang"/>
                 <a:cs typeface="Batang"/>
               </a:rPr>
-              <a:t> * 소매 업체</a:t>
+              <a:t> * 소매업체</a:t>
             </a:r>
             <a:r>
               <a:rPr sz="1200"/>
@@ -2330,7 +2345,7 @@
                 <a:ea typeface="Batang"/>
                 <a:cs typeface="Batang"/>
               </a:rPr>
-              <a:t> * 유통 업체 * 프로모션</a:t>
+              <a:t> * 유통업체</a:t>
             </a:r>
             <a:r>
               <a:rPr sz="1200"/>
@@ -2347,7 +2362,7 @@
                 <a:ea typeface="Batang"/>
                 <a:cs typeface="Batang"/>
               </a:rPr>
-              <a:t> 계획 및 전략</a:t>
+              <a:t>* 프로모션 계획 및 전략</a:t>
             </a:r>
             <a:r>
               <a:rPr sz="1200"/>
@@ -2364,7 +2379,7 @@
                 <a:ea typeface="Batang"/>
                 <a:cs typeface="Batang"/>
               </a:rPr>
-              <a:t>* 예상 결과 및 과제 * 예상 결과 및 과제</a:t>
+              <a:t>* 예상 결과 및 과제</a:t>
             </a:r>
             <a:r>
               <a:rPr sz="1200"/>
@@ -2398,7 +2413,7 @@
                 <a:ea typeface="Batang"/>
                 <a:cs typeface="Batang"/>
               </a:rPr>
-              <a:t> * 잠재적인</a:t>
+              <a:t> * 잠재적인 과제</a:t>
             </a:r>
             <a:r>
               <a:rPr sz="1200"/>
@@ -2415,7 +2430,7 @@
                 <a:ea typeface="Batang"/>
                 <a:cs typeface="Batang"/>
               </a:rPr>
-              <a:t> 과제* 권장 사항 및 결론</a:t>
+              <a:t>* 권장 사항 및 결론</a:t>
             </a:r>
             <a:r>
               <a:rPr sz="1200"/>
@@ -2564,7 +2579,7 @@
                 <a:ea typeface="Batang"/>
                 <a:cs typeface="Batang"/>
               </a:rPr>
-              <a:t>오리지널 콘텐츠:</a:t>
+              <a:t>원본 콘텐츠:</a:t>
             </a:r>
             <a:r>
               <a:rPr sz="1200"/>
@@ -2598,7 +2613,7 @@
                 <a:ea typeface="Batang"/>
                 <a:cs typeface="Batang"/>
               </a:rPr>
-              <a:t>미스틱 스파이스 프리미엄 차이 차는 전 세계 고품질 음료를 생산하고 배포하는 전문 회사인 Contoso Beverage에서 출시한 신제품입니다. </a:t>
+              <a:t>Mystic Spice 프리미엄 차이 티는 전 세계 시장에서 사업을 운영 중인 고급 음료 생산과 유통 전문 업체 Contoso Beverage에서 출시한 신제품입니다. </a:t>
             </a:r>
             <a:r>
               <a:rPr lang="ko-KR" sz="1200" b="0" i="0" strike="noStrike" cap="none" baseline="0">
@@ -2658,31 +2673,7 @@
                 <a:ea typeface="Batang"/>
                 <a:cs typeface="Batang"/>
               </a:rPr>
-              <a:t>그리고 오래 전부터 숙박 업체에서 제공되어 왔으며 친한 친구에게 대접하거나 휴식이 필요할 때 마시는 등 역사/문화적으로도 중요한 차입니다. </a:t>
-            </a:r>
-            <a:r>
-              <a:rPr lang="ko-KR" sz="1200" b="0" i="0" strike="noStrike" cap="none" baseline="0">
-                <a:solidFill>
-                  <a:srgbClr val="000000"/>
-                </a:solidFill>
-                <a:effectLst/>
-                <a:latin typeface="Batang"/>
-                <a:ea typeface="Batang"/>
-                <a:cs typeface="Batang"/>
-              </a:rPr>
-              <a:t>이 보고서에서는 라틴 아메리카 지역을 중심으로 Mystic Spice 프리미엄 차이 티의 시장 분석 결과를 제공합니다. </a:t>
-            </a:r>
-            <a:r>
-              <a:rPr lang="ko-KR" sz="1200" b="0" i="0" strike="noStrike" cap="none" baseline="0">
-                <a:solidFill>
-                  <a:srgbClr val="000000"/>
-                </a:solidFill>
-                <a:effectLst/>
-                <a:latin typeface="Batang"/>
-                <a:ea typeface="Batang"/>
-                <a:cs typeface="Batang"/>
-              </a:rPr>
-              <a:t>보고서는 다음과 같은 측면을 다룹니다.</a:t>
+              <a:t>오래 전부터 숙박 업체에서 제공되어 왔으며 친한 친구에게 대접하거나 휴식이 필요할 때 마시는 등 역사/문화적으로도 중요한 의미가 많은 차입니다.</a:t>
             </a:r>
             <a:r>
               <a:rPr sz="1200"/>
@@ -2699,7 +2690,31 @@
                 <a:ea typeface="Batang"/>
                 <a:cs typeface="Batang"/>
               </a:rPr>
-              <a:t>·         Mystic Spice Premium Chai Tea</a:t>
+              <a:t> </a:t>
+            </a:r>
+            <a:r>
+              <a:rPr lang="ko-KR" sz="1200" b="0" i="0" strike="noStrike" cap="none" baseline="0">
+                <a:solidFill>
+                  <a:srgbClr val="000000"/>
+                </a:solidFill>
+                <a:effectLst/>
+                <a:latin typeface="Batang"/>
+                <a:ea typeface="Batang"/>
+                <a:cs typeface="Batang"/>
+              </a:rPr>
+              <a:t>이 보고서에서는 라틴 아메리카 지역을 중심으로 Mystic Spice 프리미엄 차이 티의 시장 분석 결과를 제공합니다. </a:t>
+            </a:r>
+            <a:r>
+              <a:rPr lang="ko-KR" sz="1200" b="0" i="0" strike="noStrike" cap="none" baseline="0">
+                <a:solidFill>
+                  <a:srgbClr val="000000"/>
+                </a:solidFill>
+                <a:effectLst/>
+                <a:latin typeface="Batang"/>
+                <a:ea typeface="Batang"/>
+                <a:cs typeface="Batang"/>
+              </a:rPr>
+              <a:t>보고서는 다음과 같은 측면을 다룹니다.</a:t>
             </a:r>
             <a:r>
               <a:rPr sz="1200"/>
@@ -2716,7 +2731,7 @@
                 <a:ea typeface="Batang"/>
                 <a:cs typeface="Batang"/>
               </a:rPr>
-              <a:t>의 제품 설명, 기능 및 이점         라틴 아메리카</a:t>
+              <a:t>·   Mystic Spice 프리미엄 차이 티의 제품 설명, 기능 및 이점</a:t>
             </a:r>
             <a:r>
               <a:rPr sz="1200"/>
@@ -2733,7 +2748,7 @@
                 <a:ea typeface="Batang"/>
                 <a:cs typeface="Batang"/>
               </a:rPr>
-              <a:t>의 차이차에 대한 시장 추세와 수요         라틴 아메리카</a:t>
+              <a:t>  라틴 아메리카의 차이 티에 대한 시장 추세와 수요</a:t>
             </a:r>
             <a:r>
               <a:rPr sz="1200"/>
@@ -2750,7 +2765,7 @@
                 <a:ea typeface="Batang"/>
                 <a:cs typeface="Batang"/>
               </a:rPr>
-              <a:t>의 차이 차의 경쟁 분석         라틴 아메리카</a:t>
+              <a:t>  라틴 아메리카의 차이 티의 경쟁 분석</a:t>
             </a:r>
             <a:r>
               <a:rPr sz="1200"/>
@@ -2767,7 +2782,7 @@
                 <a:ea typeface="Batang"/>
                 <a:cs typeface="Batang"/>
               </a:rPr>
-              <a:t>의 차이 차의 배포 채널·         라틴 아메리카</a:t>
+              <a:t>  라틴 아메리카의 차이 티의 배포 채널</a:t>
             </a:r>
             <a:r>
               <a:rPr sz="1200"/>
@@ -2784,7 +2799,7 @@
                 <a:ea typeface="Batang"/>
                 <a:cs typeface="Batang"/>
               </a:rPr>
-              <a:t>의 차이차 프로모션 계획 및 전략·         프로모션 계획의</a:t>
+              <a:t>· 라틴 아메리카의 차이 티 프로모션 계획 및 전략</a:t>
             </a:r>
             <a:r>
               <a:rPr sz="1200"/>
@@ -2801,7 +2816,24 @@
                 <a:ea typeface="Batang"/>
                 <a:cs typeface="Batang"/>
               </a:rPr>
-              <a:t> 예상 결과 및 과제·         라틴 아메리카의 차이 차의 미래에 대한 권장 사항 및 결론</a:t>
+              <a:t>  프로모션 계획의 예상 결과 및 과제</a:t>
+            </a:r>
+            <a:r>
+              <a:rPr sz="1200"/>
+              <a:t>
+</a:t>
+            </a:r>
+            <a:r>
+              <a:rPr lang="ko-KR" sz="1200" b="0" i="0" strike="noStrike" cap="none" baseline="0">
+                <a:solidFill>
+                  <a:srgbClr val="000000"/>
+                </a:solidFill>
+                <a:effectLst/>
+                <a:latin typeface="Batang"/>
+                <a:ea typeface="Batang"/>
+                <a:cs typeface="Batang"/>
+              </a:rPr>
+              <a:t>· 라틴 아메리카의 차이 티의 미래에 대한 권장 사항 및 결론</a:t>
             </a:r>
             <a:r>
               <a:rPr sz="1200"/>
@@ -2911,7 +2943,7 @@
                 <a:ea typeface="Batang"/>
                 <a:cs typeface="Batang"/>
               </a:rPr>
-              <a:t>각 컵은 인도의 활기찬 풍경을 통해 여행을 안내, 당신의 가정에 정통 차이 경험을 가져.</a:t>
+              <a:t>집에서도 인도의 다채로운 풍광을 느끼며 전통 인도 차이 티의 맛을 맛볼 수 있습니다.</a:t>
             </a:r>
             <a:r>
               <a:rPr sz="1200"/>
@@ -2950,7 +2982,7 @@
                 <a:ea typeface="Batang"/>
                 <a:cs typeface="Batang"/>
               </a:rPr>
-              <a:t>오리지널 콘텐츠:</a:t>
+              <a:t>원본 콘텐츠:</a:t>
             </a:r>
             <a:r>
               <a:rPr sz="1200"/>
@@ -2984,7 +3016,7 @@
                 <a:ea typeface="Batang"/>
                 <a:cs typeface="Batang"/>
               </a:rPr>
-              <a:t>신비 향신료 프리미엄 차이 차는 인도 차이의 시대를 초월한 전통에 경의를 표하는 꼼꼼하게 제작된 블렌드입니다. </a:t>
+              <a:t>Mystic Spice 프리미엄 차이 티는 인도산 차이 티의 전통과 맛을 그대로 살려 깐깐하게 만든 혼합차입니다. </a:t>
             </a:r>
             <a:r>
               <a:rPr lang="ko-KR" sz="1200" b="0" i="0" strike="noStrike" cap="none" baseline="0">
@@ -3009,6 +3041,11 @@
                 <a:cs typeface="Batang"/>
               </a:rPr>
               <a:t>Mystic Spice 프리미엄 차이 티의 제품 설명, 특징 및 이점이 아래 표에 요약되어 있습니다.</a:t>
+            </a:r>
+            <a:r>
+              <a:rPr sz="1200"/>
+              <a:t>
+</a:t>
             </a:r>
           </a:p>
         </p:txBody>
@@ -3311,7 +3348,7 @@
                 <a:ea typeface="Batang"/>
                 <a:cs typeface="Batang"/>
               </a:rPr>
-              <a:t>성장의 주요 동인으로는 인식 증가, 가처분 소득 증가, 분배 확대 등이 있습니다.</a:t>
+              <a:t>판매량 증가의 주요 요인에는 차이 티에 대한 인지도 상승, 가처분 소득 증가, 유통 채널 확대 등이 포함됩니다.</a:t>
             </a:r>
             <a:r>
               <a:rPr sz="1200"/>
@@ -3350,7 +3387,7 @@
                 <a:ea typeface="Batang"/>
                 <a:cs typeface="Batang"/>
               </a:rPr>
-              <a:t>오리지널 콘텐츠:</a:t>
+              <a:t>원본 콘텐츠:</a:t>
             </a:r>
             <a:r>
               <a:rPr sz="1200"/>
@@ -3384,7 +3421,7 @@
                 <a:ea typeface="Batang"/>
                 <a:cs typeface="Batang"/>
               </a:rPr>
-              <a:t>라틴 아메리카 시장은 건강하고 자연스럽고 이국적인 제품에 대한 수요가 증가함에 따라 차이 차를 위한 좋은 기회를 제공합니다. </a:t>
+              <a:t>몸에 좋으며 이국적인 천연 제품의 수요가 증가하고 있는 라틴 아메리카 시장은 차이 티를 판매하기에 매우 적합한 지역이라 할 수 있습니다. </a:t>
             </a:r>
             <a:r>
               <a:rPr lang="ko-KR" sz="1200" b="0" i="0" strike="noStrike" cap="none" baseline="0">
@@ -3420,43 +3457,7 @@
                 <a:ea typeface="Batang"/>
                 <a:cs typeface="Batang"/>
               </a:rPr>
-              <a:t>또한 차이 티는 단 음료를 함께 즐기기를 좋아하는 라틴 아메리카 소비자의 생활 방식과 취향에도 적합합니다. </a:t>
-            </a:r>
-            <a:r>
-              <a:rPr lang="ko-KR" sz="1200" b="0" i="0" strike="noStrike" cap="none" baseline="0">
-                <a:solidFill>
-                  <a:srgbClr val="000000"/>
-                </a:solidFill>
-                <a:effectLst/>
-                <a:latin typeface="Batang"/>
-                <a:ea typeface="Batang"/>
-                <a:cs typeface="Batang"/>
-              </a:rPr>
-              <a:t>Grand View Research의 보고서에 따르면 2019년 추산 전 세계 차이 티 시장 규모는 미화 19억 달러 규모였으며, 2027년 CAGR(연평균 성장률)은 2020년 대비 5.5% 높아질 것으로 예상됩니다. </a:t>
-            </a:r>
-            <a:r>
-              <a:rPr lang="ko-KR" sz="1200" b="0" i="0" strike="noStrike" cap="none" baseline="0">
-                <a:solidFill>
-                  <a:srgbClr val="000000"/>
-                </a:solidFill>
-                <a:effectLst/>
-                <a:latin typeface="Batang"/>
-                <a:ea typeface="Batang"/>
-                <a:cs typeface="Batang"/>
-              </a:rPr>
-              <a:t>또한 라틴 아메리카 지역은 차이 티 판매량이 가장 빠르게 늘어나고 있는 지역 중 하나이며 2027년 CAGR은 2020년 대비 6.2%나 늘어날 것이라고 합니다. </a:t>
-            </a:r>
-            <a:r>
-              <a:rPr lang="ko-KR" sz="1200" b="0" i="0" strike="noStrike" cap="none" baseline="0">
-                <a:solidFill>
-                  <a:srgbClr val="000000"/>
-                </a:solidFill>
-                <a:effectLst/>
-                <a:latin typeface="Batang"/>
-                <a:ea typeface="Batang"/>
-                <a:cs typeface="Batang"/>
-              </a:rPr>
-              <a:t>라틴 아메리카에서 차이 차의 성장을 위한 주요 동인은 다음과 같습니다.</a:t>
+              <a:t>또한 차이 티는 단 간식을 함께 즐기기를 좋아하는 라틴 아메리카 소비자의 생활 방식과 취향에도 적합합니다.</a:t>
             </a:r>
             <a:r>
               <a:rPr sz="1200"/>
@@ -3473,7 +3474,43 @@
                 <a:ea typeface="Batang"/>
                 <a:cs typeface="Batang"/>
               </a:rPr>
-              <a:t>·         차이차</a:t>
+              <a:t> </a:t>
+            </a:r>
+            <a:r>
+              <a:rPr lang="ko-KR" sz="1200" b="0" i="0" strike="noStrike" cap="none" baseline="0">
+                <a:solidFill>
+                  <a:srgbClr val="000000"/>
+                </a:solidFill>
+                <a:effectLst/>
+                <a:latin typeface="Batang"/>
+                <a:ea typeface="Batang"/>
+                <a:cs typeface="Batang"/>
+              </a:rPr>
+              <a:t>Grand View Research의 보고서에 따르면 2019년 추산 전 세계 차이 티 시장 규모는 미화 19억 달러 규모였으며, 2027년 CAGR(연평균 성장률)은 2020년 대비 5.5% 높아질 것으로 예상됩니다. </a:t>
+            </a:r>
+            <a:r>
+              <a:rPr lang="ko-KR" sz="1200" b="0" i="0" strike="noStrike" cap="none" baseline="0">
+                <a:solidFill>
+                  <a:srgbClr val="000000"/>
+                </a:solidFill>
+                <a:effectLst/>
+                <a:latin typeface="Batang"/>
+                <a:ea typeface="Batang"/>
+                <a:cs typeface="Batang"/>
+              </a:rPr>
+              <a:t>또한 라틴 아메리카 지역은 차이 티 판매량이 가장 빠르게 늘어나고 있는 지역 중 하나이며 2027년 CAGR은 2020년 대비 6.2%나 늘어날 것이라고 합니다. </a:t>
+            </a:r>
+            <a:r>
+              <a:rPr lang="ko-KR" sz="1200" b="0" i="0" strike="noStrike" cap="none" baseline="0">
+                <a:solidFill>
+                  <a:srgbClr val="000000"/>
+                </a:solidFill>
+                <a:effectLst/>
+                <a:latin typeface="Batang"/>
+                <a:ea typeface="Batang"/>
+                <a:cs typeface="Batang"/>
+              </a:rPr>
+              <a:t>라틴 아메리카에서 차이 티의 성장을 위한 주요 동인은 다음과 같습니다.</a:t>
             </a:r>
             <a:r>
               <a:rPr sz="1200"/>
@@ -3490,7 +3527,7 @@
                 <a:ea typeface="Batang"/>
                 <a:cs typeface="Batang"/>
               </a:rPr>
-              <a:t>의 건강상의 이점과 문화적 측면에 대한 인식과 관심이 증가하고 있습니다.         중산층 소비자</a:t>
+              <a:t>·         차이 티의 건강상의 이점과 문화적 측면에 대한 인식과 관심의 증가</a:t>
             </a:r>
             <a:r>
               <a:rPr sz="1200"/>
@@ -3507,7 +3544,7 @@
                 <a:ea typeface="Batang"/>
                 <a:cs typeface="Batang"/>
               </a:rPr>
-              <a:t>의 가처분 소득과 지출 능력 증가         젊은층과 도시층 사이에서 전문차와 프리미엄 차의 인기가 높아지고 있습니다</a:t>
+              <a:t>         중산층 소비자의 가처분 소득과 지출 능력 증가</a:t>
             </a:r>
             <a:r>
               <a:rPr sz="1200"/>
@@ -3524,7 +3561,7 @@
                 <a:ea typeface="Batang"/>
                 <a:cs typeface="Batang"/>
               </a:rPr>
-              <a:t>.         슈퍼마켓, 카페, 온라인 플랫폼</a:t>
+              <a:t>         젊은층과 도시층 사이에서 전문 차와 프리미엄 차의 인기 상승.</a:t>
             </a:r>
             <a:r>
               <a:rPr sz="1200"/>
@@ -3541,7 +3578,24 @@
                 <a:ea typeface="Batang"/>
                 <a:cs typeface="Batang"/>
               </a:rPr>
-              <a:t> 등 다양한 채널에서 차이 차 제품의 배포 및 가용성 확대         바로 마실 수 있는 인스턴트 및 유기농 품종과 같은 차이 차의 새롭고 혁신적인 맛과 형식의 출현</a:t>
+              <a:t>         슈퍼마켓, 카페, 온라인 플랫폼 등 다양한 채널에서 차이 티 제품의 배포 및 가용성 확대</a:t>
+            </a:r>
+            <a:r>
+              <a:rPr sz="1200"/>
+              <a:t>
+</a:t>
+            </a:r>
+            <a:r>
+              <a:rPr lang="ko-KR" sz="1200" b="0" i="0" strike="noStrike" cap="none" baseline="0">
+                <a:solidFill>
+                  <a:srgbClr val="000000"/>
+                </a:solidFill>
+                <a:effectLst/>
+                <a:latin typeface="Batang"/>
+                <a:ea typeface="Batang"/>
+                <a:cs typeface="Batang"/>
+              </a:rPr>
+              <a:t>         바로 마실 수 있는 인스턴트 및 유기농 품종과 같은 차이 티의 새롭고 혁신적인 맛과 형식의 출현</a:t>
             </a:r>
             <a:r>
               <a:rPr sz="1200"/>
@@ -3714,7 +3768,7 @@
                 <a:ea typeface="Batang"/>
                 <a:cs typeface="Batang"/>
               </a:rPr>
-              <a:t>오리지널 콘텐츠:</a:t>
+              <a:t>원본 콘텐츠:</a:t>
             </a:r>
             <a:r>
               <a:rPr sz="1200"/>
@@ -3731,19 +3785,36 @@
                 <a:ea typeface="Batang"/>
                 <a:cs typeface="Batang"/>
               </a:rPr>
-              <a:t> 라틴 아메리카의 차이차에 대한 유통 채널은 차이차 제품을 최종 소비자에게 전달하고 판매하는 방법과 수단입니다. </a:t>
-            </a:r>
-            <a:r>
-              <a:rPr lang="ko-KR" sz="1200" b="0" i="0" strike="noStrike" cap="none" baseline="0">
-                <a:solidFill>
-                  <a:srgbClr val="000000"/>
-                </a:solidFill>
-                <a:effectLst/>
-                <a:latin typeface="Batang"/>
-                <a:ea typeface="Batang"/>
-                <a:cs typeface="Batang"/>
-              </a:rPr>
-              <a:t>라틴 아메리카 지역의 차이 티 유통 채널은 소매 업체, 도매 업체, 유통업체의 세 가지 유형으로 분류할 수 있습니다. </a:t>
+              <a:t>라틴 아메리카 지역의 각 차이 티 유통 채널은 차이 티 제품이 최종 고객에게 제공 및 판매되는 방식과 수단입니다. </a:t>
+            </a:r>
+            <a:r>
+              <a:rPr lang="ko-KR" sz="1200" b="0" i="0" strike="noStrike" cap="none" baseline="0">
+                <a:solidFill>
+                  <a:srgbClr val="000000"/>
+                </a:solidFill>
+                <a:effectLst/>
+                <a:latin typeface="Batang"/>
+                <a:ea typeface="Batang"/>
+                <a:cs typeface="Batang"/>
+              </a:rPr>
+              <a:t>라틴 아메리카 지역의 차이 티 유통 채널은 소매업체, 도매업체, 유통업체의 세 가지 유형으로 분류할 수 있습니다.</a:t>
+            </a:r>
+            <a:r>
+              <a:rPr sz="1200"/>
+              <a:t>
+</a:t>
+            </a:r>
+            <a:r>
+              <a:rPr lang="ko-KR" sz="1200" b="0" i="0" strike="noStrike" cap="none" baseline="0">
+                <a:solidFill>
+                  <a:srgbClr val="000000"/>
+                </a:solidFill>
+                <a:effectLst/>
+                <a:latin typeface="Batang"/>
+                <a:ea typeface="Batang"/>
+                <a:cs typeface="Batang"/>
+              </a:rPr>
+              <a:t> </a:t>
             </a:r>
             <a:r>
               <a:rPr lang="ko-KR" sz="1200" b="0" i="0" strike="noStrike" cap="none" baseline="0">
@@ -3791,7 +3862,12 @@
                 <a:ea typeface="Batang"/>
                 <a:cs typeface="Batang"/>
               </a:rPr>
-              <a:t>라틴 아메리카 지역의 주요 차이 티 제품 소매 업체로는 Walmart, Carrefour, Oxxo, Starbucks, Amazon 등이 있습니다.</a:t>
+              <a:t>라틴 아메리카 지역의 주요 차이 티 제품 소매업체로는 Walmart, Carrefour, Oxxo, Starbucks, Amazon 등이 있습니다.</a:t>
+            </a:r>
+            <a:r>
+              <a:rPr sz="1200"/>
+              <a:t>
+</a:t>
             </a:r>
           </a:p>
         </p:txBody>
@@ -3908,7 +3984,7 @@
                 <a:ea typeface="Batang"/>
                 <a:cs typeface="Batang"/>
               </a:rPr>
-              <a:t>라틴 아메리카의 주요 도매업체로는 Cencosud, Grupo Pao de Acucar, La Anonima 및 Makro가 있습니다.</a:t>
+              <a:t>라틴 아메리카 지역의 주요 차이 티 제품 도매업체로는 Cencosud, Grupo Pao de Acucar, La Anonima, Makro 등이 있습니다.</a:t>
             </a:r>
             <a:r>
               <a:rPr sz="1200"/>
@@ -3964,7 +4040,7 @@
                 <a:ea typeface="Batang"/>
                 <a:cs typeface="Batang"/>
               </a:rPr>
-              <a:t>도매업자는 제조업체 또는 유통업체로부터 Chai 차 제품을 대량으로 구입하고 소매업체 또는 기타 중개인에게 판매하는 기업입니다. </a:t>
+              <a:t>도매업체는 제조업체나 유통업체에서 차이 티 제품을 대량 구매하여 소매업체나 기타 중개업체에 판매하는 기업입니다. </a:t>
             </a:r>
             <a:r>
               <a:rPr lang="ko-KR" sz="1200" b="0" i="0" strike="noStrike" cap="none" baseline="0">
@@ -4000,7 +4076,12 @@
                 <a:ea typeface="Batang"/>
                 <a:cs typeface="Batang"/>
               </a:rPr>
-              <a:t>라틴 아메리카 지역의 주요 차이 티 제품 도매 업체로는 Cencosud, Grupo Pao de Acucar, La Anonima, Makro 등이 있습니다.</a:t>
+              <a:t>라틴 아메리카 지역의 주요 차이 티 제품 도매업체로는 Cencosud, Grupo Pao de Acucar, La Anonima, Makro 등이 있습니다.</a:t>
+            </a:r>
+            <a:r>
+              <a:rPr sz="1200"/>
+              <a:t>
+</a:t>
             </a:r>
           </a:p>
         </p:txBody>
@@ -8258,7 +8339,7 @@
                 <a:ea typeface="Batang"/>
                 <a:cs typeface="Batang"/>
               </a:rPr>
-              <a:t>배포 채널: 배포자</a:t>
+              <a:t>배포 채널: 유통업체</a:t>
             </a:r>
           </a:p>
         </p:txBody>
@@ -11708,7 +11789,7 @@
                     <a:lstStyle/>
                     <a:p>
                       <a:r>
-                        <a:rPr lang="ko-KR" sz="3300" b="0" i="0" strike="noStrike" cap="none" baseline="0">
+                        <a:rPr lang="ko-KR" sz="3300" b="1" i="0" strike="noStrike" cap="none" baseline="0">
                           <a:solidFill>
                             <a:srgbClr val="FFFFFF"/>
                           </a:solidFill>
@@ -12191,7 +12272,7 @@
                         </a:spcAft>
                       </a:pPr>
                       <a:r>
-                        <a:rPr lang="ko-KR" sz="1400" b="0" i="0" strike="noStrike" cap="none" baseline="0">
+                        <a:rPr lang="ko-KR" sz="1400" b="1" i="0" strike="noStrike" cap="none" baseline="0">
                           <a:solidFill>
                             <a:srgbClr val="FFFFFF"/>
                           </a:solidFill>
@@ -12378,7 +12459,7 @@
                           <a:ea typeface="Batang"/>
                           <a:cs typeface="Batang"/>
                         </a:rPr>
-                        <a:t>정통 블렌드: 저희 차이는 프리미엄 홍차 잎과 계피, 카다몬, 정향, 생강, 후추 등 다양한 지상 향신료의 조화로운 조합입니다. </a:t>
+                        <a:t>정통 블렌드: 저희 차이는 프리미엄 홍차 잎과 계피, 카다몬, 정향, 생강, 후추 등 다양한 시그니처 지상 향신료와의 조화로운 믹스로 이루어집니다. </a:t>
                       </a:r>
                       <a:r>
                         <a:rPr lang="ko-KR" sz="1400" b="0" i="0" strike="noStrike" cap="none" baseline="0">
@@ -12419,7 +12500,7 @@
                           <a:ea typeface="Batang"/>
                           <a:cs typeface="Batang"/>
                         </a:rPr>
-                        <a:t>건강 강화 성분: 신비 향신료 차이 차의 각 성분은 천연 건강상의 이점을 위해 선택됩니다. </a:t>
+                        <a:t>건강 강화 성분: Mystic Spice 차이 티의 각 성분은 천연의 건강 혜택에 기반하여 엄선됩니다. </a:t>
                       </a:r>
                       <a:r>
                         <a:rPr lang="ko-KR" sz="1400" b="0" i="0" strike="noStrike" cap="none" baseline="0">
@@ -12910,7 +12991,7 @@
                         </a:spcAft>
                       </a:pPr>
                       <a:r>
-                        <a:rPr lang="ko-KR" sz="1100" b="0" i="0" strike="noStrike" cap="none" baseline="0">
+                        <a:rPr lang="ko-KR" sz="1100" b="1" i="0" strike="noStrike" cap="none" baseline="0">
                           <a:solidFill>
                             <a:srgbClr val="FFFFFF"/>
                           </a:solidFill>
@@ -12955,7 +13036,7 @@
                           <a:ea typeface="Batang"/>
                           <a:cs typeface="Batang"/>
                         </a:rPr>
-                        <a:t>풍부한 아로마와 맛: 따뜻하고 매운 향기와 우리의 차이의 깊고 상쾌한 맛은 하루를 시작하거나 저녁에 긴장을 풀 수있는 완벽한 음료입니다. </a:t>
+                        <a:t>풍부한 아로마와 맛: 저희 차이의 따뜻하고 매운 향기와 깊고 상쾌한 맛은 하루를 시작하거나 저녁에 긴장을 풀기에 완벽한 음료의 조건입니다. </a:t>
                       </a:r>
                       <a:r>
                         <a:rPr lang="ko-KR" sz="1100" b="0" i="0" strike="noStrike" cap="none" baseline="0">
@@ -12996,7 +13077,7 @@
                           <a:ea typeface="Batang"/>
                           <a:cs typeface="Batang"/>
                         </a:rPr>
-                        <a:t>다재다능한 양조 옵션: 차이 김이 뜨거워지거나, 상쾌한 아이스 티로, 크리미한 라떼를 좋아하든, 저희 블렌드는 모든 취향에 맞게 다재다능합니다. </a:t>
+                        <a:t>다양한 브루잉 옵션: 김이 뜨겁게 올라오는 차이나, 상쾌한 아이스 티, 크리미한 라떼 등, 저희 블렌드는 모든 취향에 맞는 다양성을 제공합니다. </a:t>
                       </a:r>
                       <a:r>
                         <a:rPr lang="ko-KR" sz="1100" b="0" i="0" strike="noStrike" cap="none" baseline="0">
@@ -13044,7 +13125,7 @@
                           <a:ea typeface="Batang"/>
                           <a:cs typeface="Batang"/>
                         </a:rPr>
-                        <a:t>지속 가능한 공급: 지속 가능성을 위해 최선을 다하고 있으며, 우리는 유기농 농업을 실천하는 소규모 농장에서 재료를 공급하여 최고의 품질뿐만 아니라 지구의 복지를 보장합니다.</a:t>
+                        <a:t>지속 가능한 공급: 저희는 지속 가능성을 위해 최선을 다하고 있으며, 유기농 농업을 실천하는 소규모 농장에서 재료를 공급함으로써 최고의 품질뿐만 아니라 지구의 건강에도 이바지하고 있습니다.</a:t>
                       </a:r>
                       <a:endParaRPr lang="en-US" sz="1700">
                         <a:effectLst/>
@@ -13073,7 +13154,7 @@
                           <a:ea typeface="Batang"/>
                           <a:cs typeface="Batang"/>
                         </a:rPr>
-                        <a:t>우아한 패키징: 신비주의 향신료 차이 차는 아름답게 디자인된 친환경 포장재로 제공되며, 차 애호가들에게 이상적인 선물이거나 호화로운 간식입니다.</a:t>
+                        <a:t>우아한 패키징: Mystic Spice 차이 티는 아름답게 디자인된 친환경 포장재로 제공되므로 차 애호가들에게 뿐만 아니라 자신에게도 이상적이고 고급스러운 선물이 될 수 있습니다.</a:t>
                       </a:r>
                       <a:endParaRPr lang="en-US" sz="1700">
                         <a:effectLst/>
@@ -13109,7 +13190,7 @@
                           <a:ea typeface="Batang"/>
                           <a:cs typeface="Batang"/>
                         </a:rPr>
-                        <a:t>고객 만족 보장: Microsoft는 제품 뒤에 서서 만족도 보장을 제공합니다. </a:t>
+                        <a:t>고객 만족 보장: 저희는 제품을 뒷받침하며 고객 만족을 보장합니다. </a:t>
                       </a:r>
                       <a:r>
                         <a:rPr lang="ko-KR" sz="1100" b="0" i="0" strike="noStrike" cap="none" baseline="0">
@@ -13150,7 +13231,7 @@
                           <a:ea typeface="Batang"/>
                           <a:cs typeface="Batang"/>
                         </a:rPr>
-                        <a:t>이상적인 대상: 차 애호가, 건강에 민감한 개인, 따뜻하고 매운 음료 애호가, 전통적인 인도 차이의 풍부한 맛을 탐구하고자하는 사람.</a:t>
+                        <a:t>이상적인 대상: 차 애호가, 건강에 민감한 사람, 따뜻하고 매운 음료 애호가, 전통적인 인도 차이의 풍부한 맛을 탐구하고자하는 모든 사람.</a:t>
                       </a:r>
                       <a:endParaRPr lang="en-US" sz="1700">
                         <a:effectLst/>
@@ -13843,7 +13924,7 @@
                     <a:lstStyle/>
                     <a:p>
                       <a:r>
-                        <a:rPr lang="ko-KR" sz="2000" b="0" i="0" strike="noStrike" cap="all" baseline="0">
+                        <a:rPr lang="ko-KR" sz="2000" b="1" i="0" strike="noStrike" cap="all" baseline="0">
                           <a:solidFill>
                             <a:srgbClr val="000000"/>
                           </a:solidFill>
@@ -13852,7 +13933,7 @@
                           <a:ea typeface="Batang"/>
                           <a:cs typeface="Batang"/>
                         </a:rPr>
-                        <a:t>차이 티 시장 규모(미화, 10억 달러 단위)</a:t>
+                        <a:t>차이 티 시장 규모(USD 10억 달러)</a:t>
                       </a:r>
                     </a:p>
                   </a:txBody>
@@ -13878,7 +13959,7 @@
                     <a:lstStyle/>
                     <a:p>
                       <a:r>
-                        <a:rPr lang="ko-KR" sz="2000" b="0" i="0" strike="noStrike" cap="all" baseline="0">
+                        <a:rPr lang="ko-KR" sz="2000" b="1" i="0" strike="noStrike" cap="all" baseline="0">
                           <a:solidFill>
                             <a:srgbClr val="000000"/>
                           </a:solidFill>
@@ -13887,7 +13968,7 @@
                           <a:ea typeface="Batang"/>
                           <a:cs typeface="Batang"/>
                         </a:rPr>
-                        <a:t>CAGR\(2020~2027년)</a:t>
+                        <a:t>CAGR(2020-2027)</a:t>
                       </a:r>
                     </a:p>
                   </a:txBody>
@@ -14378,7 +14459,7 @@
                 <a:ea typeface="Batang"/>
                 <a:cs typeface="Batang"/>
               </a:rPr>
-              <a:t>배포 채널: 소매점</a:t>
+              <a:t>배포 채널: 소매업체</a:t>
             </a:r>
           </a:p>
         </p:txBody>
@@ -14421,7 +14502,7 @@
                 <a:ea typeface="Batang"/>
                 <a:cs typeface="Batang"/>
               </a:rPr>
-              <a:t>소매업체: 소비자에게 직접 차이 차 제품 판매</a:t>
+              <a:t>소매업체: 소비자에게 직접 차이 티 제품 판매</a:t>
             </a:r>
           </a:p>
           <a:p>
@@ -14495,7 +14576,7 @@
                 <a:ea typeface="Batang"/>
                 <a:cs typeface="Batang"/>
               </a:rPr>
-              <a:t>도매업자: 차이 차 제품을 소매업체에 대량으로 판매</a:t>
+              <a:t>도매업체: 차이 티 제품을 소매업체에 대량으로 판매</a:t>
             </a:r>
           </a:p>
           <a:p>
@@ -14509,7 +14590,7 @@
                 <a:ea typeface="Batang"/>
                 <a:cs typeface="Batang"/>
               </a:rPr>
-              <a:t>유통업체: 제조업체에서 소매업체로 차이 차 제품 운송</a:t>
+              <a:t>유통업체: 제조업체에서 소매업체로 차이 티 제품 운송</a:t>
             </a:r>
           </a:p>
         </p:txBody>

</xml_diff>

<commit_message>
Copy Files From Source Repo (2025-02-12 19:15)
</commit_message>
<xml_diff>
--- a/ResourceFiles/Mystic Spice Premium Chai Market Analysis Presentation.pptx
+++ b/ResourceFiles/Mystic Spice Premium Chai Market Analysis Presentation.pptx
@@ -1,6 +1,6 @@
 
 <file path=ppt/presentation.xml><?xml version="1.0" encoding="utf-8"?>
-<!--Generated by Aspose.Slides for Java 23.6.1-->
+<!--Generated by Aspose.Slides for Java 23.6-->
 <p:presentation xmlns:r="http://schemas.openxmlformats.org/officeDocument/2006/relationships" xmlns:a="http://schemas.openxmlformats.org/drawingml/2006/main" xmlns:p="http://schemas.openxmlformats.org/presentationml/2006/main" removePersonalInfoOnSave="1" saveSubsetFonts="1">
   <p:sldMasterIdLst>
     <p:sldMasterId id="2147483660" r:id="rId1"/>
@@ -7993,6 +7993,77 @@
           </a:prstGeom>
         </p:spPr>
       </p:pic>
+      <p:sp>
+        <p:nvSpPr>
+          <p:cNvPr id="20" name="TextBox"/>
+          <p:cNvSpPr txBox="1">
+            <a:spLocks noGrp="1" noSelect="1" noRot="1" noMove="1"/>
+          </p:cNvSpPr>
+          <p:nvPr/>
+        </p:nvSpPr>
+        <p:spPr>
+          <a:xfrm>
+            <a:off x="2890520" y="2644140"/>
+            <a:ext cx="6411372" cy="1569660"/>
+          </a:xfrm>
+          <a:prstGeom prst="rect">
+            <a:avLst/>
+          </a:prstGeom>
+          <a:noFill/>
+        </p:spPr>
+        <p:txBody>
+          <a:bodyPr wrap="none" rtlCol="0" anchor="ctr" anchorCtr="1">
+            <a:spAutoFit/>
+          </a:bodyPr>
+          <a:lstStyle>
+            <a:lvl1pPr algn="l">
+              <a:lnSpc>
+                <a:spcPct val="150000"/>
+              </a:lnSpc>
+              <a:spcBef>
+                <a:spcPct val="0"/>
+              </a:spcBef>
+              <a:spcAft>
+                <a:spcPct val="0"/>
+              </a:spcAft>
+              <a:defRPr lang="en-US" sz="3200" b="1" noProof="1" dirty="0">
+                <a:solidFill>
+                  <a:prstClr val="red">
+                    <a:lumOff val="30000"/>
+                    <a:alpha val="40000"/>
+                  </a:prstClr>
+                </a:solidFill>
+                <a:effectLst>
+                  <a:outerShdw blurRad="50800" dist="38100" algn="tr" rotWithShape="0">
+                    <a:prstClr val="black">
+                      <a:alpha val="80000"/>
+                    </a:prstClr>
+                  </a:outerShdw>
+                </a:effectLst>
+                <a:latin typeface="Calibri" pitchFamily="34" charset="0"/>
+              </a:defRPr>
+            </a:lvl1pPr>
+          </a:lstStyle>
+          <a:p>
+            <a:pPr algn="ctr"/>
+            <a:r>
+              <a:t>Evaluation only.</a:t>
+            </a:r>
+          </a:p>
+          <a:p>
+            <a:pPr algn="ctr"/>
+            <a:r>
+              <a:t>Created with Aspose.Slides for Java 23.6.</a:t>
+            </a:r>
+          </a:p>
+          <a:p>
+            <a:pPr algn="ctr"/>
+            <a:r>
+              <a:t>Copyright 2004-2023 Aspose Pty Ltd.</a:t>
+            </a:r>
+          </a:p>
+        </p:txBody>
+      </p:sp>
     </p:spTree>
     <p:extLst>
       <p:ext uri="{BB962C8B-B14F-4D97-AF65-F5344CB8AC3E}">
@@ -8648,6 +8719,77 @@
           </a:prstGeom>
         </p:spPr>
       </p:pic>
+      <p:sp>
+        <p:nvSpPr>
+          <p:cNvPr id="17" name="TextBox"/>
+          <p:cNvSpPr txBox="1">
+            <a:spLocks noGrp="1" noSelect="1" noRot="1" noMove="1"/>
+          </p:cNvSpPr>
+          <p:nvPr/>
+        </p:nvSpPr>
+        <p:spPr>
+          <a:xfrm>
+            <a:off x="2890520" y="2644140"/>
+            <a:ext cx="6411372" cy="1569660"/>
+          </a:xfrm>
+          <a:prstGeom prst="rect">
+            <a:avLst/>
+          </a:prstGeom>
+          <a:noFill/>
+        </p:spPr>
+        <p:txBody>
+          <a:bodyPr wrap="none" rtlCol="0" anchor="ctr" anchorCtr="1">
+            <a:spAutoFit/>
+          </a:bodyPr>
+          <a:lstStyle>
+            <a:lvl1pPr algn="l">
+              <a:lnSpc>
+                <a:spcPct val="150000"/>
+              </a:lnSpc>
+              <a:spcBef>
+                <a:spcPct val="0"/>
+              </a:spcBef>
+              <a:spcAft>
+                <a:spcPct val="0"/>
+              </a:spcAft>
+              <a:defRPr lang="en-US" sz="3200" b="1" noProof="1" dirty="0">
+                <a:solidFill>
+                  <a:prstClr val="red">
+                    <a:lumOff val="30000"/>
+                    <a:alpha val="40000"/>
+                  </a:prstClr>
+                </a:solidFill>
+                <a:effectLst>
+                  <a:outerShdw blurRad="50800" dist="38100" algn="tr" rotWithShape="0">
+                    <a:prstClr val="black">
+                      <a:alpha val="80000"/>
+                    </a:prstClr>
+                  </a:outerShdw>
+                </a:effectLst>
+                <a:latin typeface="Calibri" pitchFamily="34" charset="0"/>
+              </a:defRPr>
+            </a:lvl1pPr>
+          </a:lstStyle>
+          <a:p>
+            <a:pPr algn="ctr"/>
+            <a:r>
+              <a:t>Evaluation only.</a:t>
+            </a:r>
+          </a:p>
+          <a:p>
+            <a:pPr algn="ctr"/>
+            <a:r>
+              <a:t>Created with Aspose.Slides for Java 23.6.</a:t>
+            </a:r>
+          </a:p>
+          <a:p>
+            <a:pPr algn="ctr"/>
+            <a:r>
+              <a:t>Copyright 2004-2023 Aspose Pty Ltd.</a:t>
+            </a:r>
+          </a:p>
+        </p:txBody>
+      </p:sp>
     </p:spTree>
     <p:extLst>
       <p:ext uri="{BB962C8B-B14F-4D97-AF65-F5344CB8AC3E}">
@@ -9108,6 +9250,77 @@
           </a:p>
         </p:txBody>
       </p:sp>
+      <p:sp>
+        <p:nvSpPr>
+          <p:cNvPr id="11" name="TextBox"/>
+          <p:cNvSpPr txBox="1">
+            <a:spLocks noGrp="1" noSelect="1" noRot="1" noMove="1"/>
+          </p:cNvSpPr>
+          <p:nvPr/>
+        </p:nvSpPr>
+        <p:spPr>
+          <a:xfrm>
+            <a:off x="2890520" y="2644140"/>
+            <a:ext cx="6411372" cy="1569660"/>
+          </a:xfrm>
+          <a:prstGeom prst="rect">
+            <a:avLst/>
+          </a:prstGeom>
+          <a:noFill/>
+        </p:spPr>
+        <p:txBody>
+          <a:bodyPr wrap="none" rtlCol="0" anchor="ctr" anchorCtr="1">
+            <a:spAutoFit/>
+          </a:bodyPr>
+          <a:lstStyle>
+            <a:lvl1pPr algn="l">
+              <a:lnSpc>
+                <a:spcPct val="150000"/>
+              </a:lnSpc>
+              <a:spcBef>
+                <a:spcPct val="0"/>
+              </a:spcBef>
+              <a:spcAft>
+                <a:spcPct val="0"/>
+              </a:spcAft>
+              <a:defRPr lang="en-US" sz="3200" b="1" noProof="1" dirty="0">
+                <a:solidFill>
+                  <a:prstClr val="red">
+                    <a:lumOff val="30000"/>
+                    <a:alpha val="40000"/>
+                  </a:prstClr>
+                </a:solidFill>
+                <a:effectLst>
+                  <a:outerShdw blurRad="50800" dist="38100" algn="tr" rotWithShape="0">
+                    <a:prstClr val="black">
+                      <a:alpha val="80000"/>
+                    </a:prstClr>
+                  </a:outerShdw>
+                </a:effectLst>
+                <a:latin typeface="Calibri" pitchFamily="34" charset="0"/>
+              </a:defRPr>
+            </a:lvl1pPr>
+          </a:lstStyle>
+          <a:p>
+            <a:pPr algn="ctr"/>
+            <a:r>
+              <a:t>Evaluation only.</a:t>
+            </a:r>
+          </a:p>
+          <a:p>
+            <a:pPr algn="ctr"/>
+            <a:r>
+              <a:t>Created with Aspose.Slides for Java 23.6.</a:t>
+            </a:r>
+          </a:p>
+          <a:p>
+            <a:pPr algn="ctr"/>
+            <a:r>
+              <a:t>Copyright 2004-2023 Aspose Pty Ltd.</a:t>
+            </a:r>
+          </a:p>
+        </p:txBody>
+      </p:sp>
     </p:spTree>
     <p:extLst>
       <p:ext uri="{BB962C8B-B14F-4D97-AF65-F5344CB8AC3E}">
@@ -9535,6 +9748,77 @@
                 <a:cs typeface="Batang"/>
               </a:rPr>
               <a:t>해당 지역의 차이 티 고객 만족도 및 유지율 25% 상승</a:t>
+            </a:r>
+          </a:p>
+        </p:txBody>
+      </p:sp>
+      <p:sp>
+        <p:nvSpPr>
+          <p:cNvPr id="17" name="TextBox"/>
+          <p:cNvSpPr txBox="1">
+            <a:spLocks noGrp="1" noSelect="1" noRot="1" noMove="1"/>
+          </p:cNvSpPr>
+          <p:nvPr/>
+        </p:nvSpPr>
+        <p:spPr>
+          <a:xfrm>
+            <a:off x="2890520" y="2644140"/>
+            <a:ext cx="6411372" cy="1569660"/>
+          </a:xfrm>
+          <a:prstGeom prst="rect">
+            <a:avLst/>
+          </a:prstGeom>
+          <a:noFill/>
+        </p:spPr>
+        <p:txBody>
+          <a:bodyPr wrap="none" rtlCol="0" anchor="ctr" anchorCtr="1">
+            <a:spAutoFit/>
+          </a:bodyPr>
+          <a:lstStyle>
+            <a:lvl1pPr algn="l">
+              <a:lnSpc>
+                <a:spcPct val="150000"/>
+              </a:lnSpc>
+              <a:spcBef>
+                <a:spcPct val="0"/>
+              </a:spcBef>
+              <a:spcAft>
+                <a:spcPct val="0"/>
+              </a:spcAft>
+              <a:defRPr lang="en-US" sz="3200" b="1" noProof="1" dirty="0">
+                <a:solidFill>
+                  <a:prstClr val="red">
+                    <a:lumOff val="30000"/>
+                    <a:alpha val="40000"/>
+                  </a:prstClr>
+                </a:solidFill>
+                <a:effectLst>
+                  <a:outerShdw blurRad="50800" dist="38100" algn="tr" rotWithShape="0">
+                    <a:prstClr val="black">
+                      <a:alpha val="80000"/>
+                    </a:prstClr>
+                  </a:outerShdw>
+                </a:effectLst>
+                <a:latin typeface="Calibri" pitchFamily="34" charset="0"/>
+              </a:defRPr>
+            </a:lvl1pPr>
+          </a:lstStyle>
+          <a:p>
+            <a:pPr algn="ctr"/>
+            <a:r>
+              <a:t>Evaluation only.</a:t>
+            </a:r>
+          </a:p>
+          <a:p>
+            <a:pPr algn="ctr"/>
+            <a:r>
+              <a:t>Created with Aspose.Slides for Java 23.6.</a:t>
+            </a:r>
+          </a:p>
+          <a:p>
+            <a:pPr algn="ctr"/>
+            <a:r>
+              <a:t>Copyright 2004-2023 Aspose Pty Ltd.</a:t>
             </a:r>
           </a:p>
         </p:txBody>
@@ -9841,6 +10125,77 @@
           </a:p>
         </p:txBody>
       </p:sp>
+      <p:sp>
+        <p:nvSpPr>
+          <p:cNvPr id="11" name="TextBox"/>
+          <p:cNvSpPr txBox="1">
+            <a:spLocks noGrp="1" noSelect="1" noRot="1" noMove="1"/>
+          </p:cNvSpPr>
+          <p:nvPr/>
+        </p:nvSpPr>
+        <p:spPr>
+          <a:xfrm>
+            <a:off x="2890520" y="2644140"/>
+            <a:ext cx="6411372" cy="1569660"/>
+          </a:xfrm>
+          <a:prstGeom prst="rect">
+            <a:avLst/>
+          </a:prstGeom>
+          <a:noFill/>
+        </p:spPr>
+        <p:txBody>
+          <a:bodyPr wrap="none" rtlCol="0" anchor="ctr" anchorCtr="1">
+            <a:spAutoFit/>
+          </a:bodyPr>
+          <a:lstStyle>
+            <a:lvl1pPr algn="l">
+              <a:lnSpc>
+                <a:spcPct val="150000"/>
+              </a:lnSpc>
+              <a:spcBef>
+                <a:spcPct val="0"/>
+              </a:spcBef>
+              <a:spcAft>
+                <a:spcPct val="0"/>
+              </a:spcAft>
+              <a:defRPr lang="en-US" sz="3200" b="1" noProof="1" dirty="0">
+                <a:solidFill>
+                  <a:prstClr val="red">
+                    <a:lumOff val="30000"/>
+                    <a:alpha val="40000"/>
+                  </a:prstClr>
+                </a:solidFill>
+                <a:effectLst>
+                  <a:outerShdw blurRad="50800" dist="38100" algn="tr" rotWithShape="0">
+                    <a:prstClr val="black">
+                      <a:alpha val="80000"/>
+                    </a:prstClr>
+                  </a:outerShdw>
+                </a:effectLst>
+                <a:latin typeface="Calibri" pitchFamily="34" charset="0"/>
+              </a:defRPr>
+            </a:lvl1pPr>
+          </a:lstStyle>
+          <a:p>
+            <a:pPr algn="ctr"/>
+            <a:r>
+              <a:t>Evaluation only.</a:t>
+            </a:r>
+          </a:p>
+          <a:p>
+            <a:pPr algn="ctr"/>
+            <a:r>
+              <a:t>Created with Aspose.Slides for Java 23.6.</a:t>
+            </a:r>
+          </a:p>
+          <a:p>
+            <a:pPr algn="ctr"/>
+            <a:r>
+              <a:t>Copyright 2004-2023 Aspose Pty Ltd.</a:t>
+            </a:r>
+          </a:p>
+        </p:txBody>
+      </p:sp>
     </p:spTree>
     <p:extLst>
       <p:ext uri="{BB962C8B-B14F-4D97-AF65-F5344CB8AC3E}">
@@ -10068,7 +10423,7 @@
         </p:spPr>
         <p:txBody>
           <a:bodyPr anchor="ctr">
-            <a:normAutofit/>
+            <a:normAutofit lnSpcReduction="10000"/>
           </a:bodyPr>
           <a:lstStyle/>
           <a:p>
@@ -10259,6 +10614,77 @@
                 <a:cs typeface="Batang"/>
               </a:rPr>
               <a:t>지속적으로 프로모션 계획 및 전략 모니터링, 평가 및 조정</a:t>
+            </a:r>
+          </a:p>
+        </p:txBody>
+      </p:sp>
+      <p:sp>
+        <p:nvSpPr>
+          <p:cNvPr id="11" name="TextBox"/>
+          <p:cNvSpPr txBox="1">
+            <a:spLocks noGrp="1" noSelect="1" noRot="1" noMove="1"/>
+          </p:cNvSpPr>
+          <p:nvPr/>
+        </p:nvSpPr>
+        <p:spPr>
+          <a:xfrm>
+            <a:off x="2890520" y="2644140"/>
+            <a:ext cx="6411372" cy="1569660"/>
+          </a:xfrm>
+          <a:prstGeom prst="rect">
+            <a:avLst/>
+          </a:prstGeom>
+          <a:noFill/>
+        </p:spPr>
+        <p:txBody>
+          <a:bodyPr wrap="none" rtlCol="0" anchor="ctr" anchorCtr="1">
+            <a:spAutoFit/>
+          </a:bodyPr>
+          <a:lstStyle>
+            <a:lvl1pPr algn="l">
+              <a:lnSpc>
+                <a:spcPct val="150000"/>
+              </a:lnSpc>
+              <a:spcBef>
+                <a:spcPct val="0"/>
+              </a:spcBef>
+              <a:spcAft>
+                <a:spcPct val="0"/>
+              </a:spcAft>
+              <a:defRPr lang="en-US" sz="3200" b="1" noProof="1" dirty="0">
+                <a:solidFill>
+                  <a:prstClr val="red">
+                    <a:lumOff val="30000"/>
+                    <a:alpha val="40000"/>
+                  </a:prstClr>
+                </a:solidFill>
+                <a:effectLst>
+                  <a:outerShdw blurRad="50800" dist="38100" algn="tr" rotWithShape="0">
+                    <a:prstClr val="black">
+                      <a:alpha val="80000"/>
+                    </a:prstClr>
+                  </a:outerShdw>
+                </a:effectLst>
+                <a:latin typeface="Calibri" pitchFamily="34" charset="0"/>
+              </a:defRPr>
+            </a:lvl1pPr>
+          </a:lstStyle>
+          <a:p>
+            <a:pPr algn="ctr"/>
+            <a:r>
+              <a:t>Evaluation only.</a:t>
+            </a:r>
+          </a:p>
+          <a:p>
+            <a:pPr algn="ctr"/>
+            <a:r>
+              <a:t>Created with Aspose.Slides for Java 23.6.</a:t>
+            </a:r>
+          </a:p>
+          <a:p>
+            <a:pPr algn="ctr"/>
+            <a:r>
+              <a:t>Copyright 2004-2023 Aspose Pty Ltd.</a:t>
             </a:r>
           </a:p>
         </p:txBody>
@@ -10586,7 +11012,7 @@
                 <a:ea typeface="Batang"/>
                 <a:cs typeface="Batang"/>
               </a:rPr>
-              <a:t>제품 설명</a:t>
+              <a:t>제품 설명:</a:t>
             </a:r>
           </a:p>
           <a:p>
@@ -10739,6 +11165,77 @@
                 <a:cs typeface="Batang"/>
               </a:rPr>
               <a:t>권장 사항 및 결론</a:t>
+            </a:r>
+          </a:p>
+        </p:txBody>
+      </p:sp>
+      <p:sp>
+        <p:nvSpPr>
+          <p:cNvPr id="20" name="TextBox"/>
+          <p:cNvSpPr txBox="1">
+            <a:spLocks noGrp="1" noSelect="1" noRot="1" noMove="1"/>
+          </p:cNvSpPr>
+          <p:nvPr/>
+        </p:nvSpPr>
+        <p:spPr>
+          <a:xfrm>
+            <a:off x="2890520" y="2644140"/>
+            <a:ext cx="6411372" cy="1569660"/>
+          </a:xfrm>
+          <a:prstGeom prst="rect">
+            <a:avLst/>
+          </a:prstGeom>
+          <a:noFill/>
+        </p:spPr>
+        <p:txBody>
+          <a:bodyPr wrap="none" rtlCol="0" anchor="ctr" anchorCtr="1">
+            <a:spAutoFit/>
+          </a:bodyPr>
+          <a:lstStyle>
+            <a:lvl1pPr algn="l">
+              <a:lnSpc>
+                <a:spcPct val="150000"/>
+              </a:lnSpc>
+              <a:spcBef>
+                <a:spcPct val="0"/>
+              </a:spcBef>
+              <a:spcAft>
+                <a:spcPct val="0"/>
+              </a:spcAft>
+              <a:defRPr lang="en-US" sz="3200" b="1" noProof="1" dirty="0">
+                <a:solidFill>
+                  <a:prstClr val="red">
+                    <a:lumOff val="30000"/>
+                    <a:alpha val="40000"/>
+                  </a:prstClr>
+                </a:solidFill>
+                <a:effectLst>
+                  <a:outerShdw blurRad="50800" dist="38100" algn="tr" rotWithShape="0">
+                    <a:prstClr val="black">
+                      <a:alpha val="80000"/>
+                    </a:prstClr>
+                  </a:outerShdw>
+                </a:effectLst>
+                <a:latin typeface="Calibri" pitchFamily="34" charset="0"/>
+              </a:defRPr>
+            </a:lvl1pPr>
+          </a:lstStyle>
+          <a:p>
+            <a:pPr algn="ctr"/>
+            <a:r>
+              <a:t>Evaluation only.</a:t>
+            </a:r>
+          </a:p>
+          <a:p>
+            <a:pPr algn="ctr"/>
+            <a:r>
+              <a:t>Created with Aspose.Slides for Java 23.6.</a:t>
+            </a:r>
+          </a:p>
+          <a:p>
+            <a:pPr algn="ctr"/>
+            <a:r>
+              <a:t>Copyright 2004-2023 Aspose Pty Ltd.</a:t>
             </a:r>
           </a:p>
         </p:txBody>
@@ -11250,6 +11747,77 @@
           </a:prstGeom>
         </p:spPr>
       </p:pic>
+      <p:sp>
+        <p:nvSpPr>
+          <p:cNvPr id="30" name="TextBox"/>
+          <p:cNvSpPr txBox="1">
+            <a:spLocks noGrp="1" noSelect="1" noRot="1" noMove="1"/>
+          </p:cNvSpPr>
+          <p:nvPr/>
+        </p:nvSpPr>
+        <p:spPr>
+          <a:xfrm>
+            <a:off x="2890520" y="2644140"/>
+            <a:ext cx="6411372" cy="1569660"/>
+          </a:xfrm>
+          <a:prstGeom prst="rect">
+            <a:avLst/>
+          </a:prstGeom>
+          <a:noFill/>
+        </p:spPr>
+        <p:txBody>
+          <a:bodyPr wrap="none" rtlCol="0" anchor="ctr" anchorCtr="1">
+            <a:spAutoFit/>
+          </a:bodyPr>
+          <a:lstStyle>
+            <a:lvl1pPr algn="l">
+              <a:lnSpc>
+                <a:spcPct val="150000"/>
+              </a:lnSpc>
+              <a:spcBef>
+                <a:spcPct val="0"/>
+              </a:spcBef>
+              <a:spcAft>
+                <a:spcPct val="0"/>
+              </a:spcAft>
+              <a:defRPr lang="en-US" sz="3200" b="1" noProof="1" dirty="0">
+                <a:solidFill>
+                  <a:prstClr val="red">
+                    <a:lumOff val="30000"/>
+                    <a:alpha val="40000"/>
+                  </a:prstClr>
+                </a:solidFill>
+                <a:effectLst>
+                  <a:outerShdw blurRad="50800" dist="38100" algn="tr" rotWithShape="0">
+                    <a:prstClr val="black">
+                      <a:alpha val="80000"/>
+                    </a:prstClr>
+                  </a:outerShdw>
+                </a:effectLst>
+                <a:latin typeface="Calibri" pitchFamily="34" charset="0"/>
+              </a:defRPr>
+            </a:lvl1pPr>
+          </a:lstStyle>
+          <a:p>
+            <a:pPr algn="ctr"/>
+            <a:r>
+              <a:t>Evaluation only.</a:t>
+            </a:r>
+          </a:p>
+          <a:p>
+            <a:pPr algn="ctr"/>
+            <a:r>
+              <a:t>Created with Aspose.Slides for Java 23.6.</a:t>
+            </a:r>
+          </a:p>
+          <a:p>
+            <a:pPr algn="ctr"/>
+            <a:r>
+              <a:t>Copyright 2004-2023 Aspose Pty Ltd.</a:t>
+            </a:r>
+          </a:p>
+        </p:txBody>
+      </p:sp>
     </p:spTree>
     <p:extLst>
       <p:ext uri="{BB962C8B-B14F-4D97-AF65-F5344CB8AC3E}">
@@ -11566,7 +12134,7 @@
                 <a:ea typeface="Batang"/>
                 <a:cs typeface="Batang"/>
               </a:rPr>
-              <a:t>제품 설명</a:t>
+              <a:t>제품 설명:</a:t>
             </a:r>
           </a:p>
         </p:txBody>
@@ -11926,6 +12494,77 @@
           </a:graphicData>
         </a:graphic>
       </p:graphicFrame>
+      <p:sp>
+        <p:nvSpPr>
+          <p:cNvPr id="20" name="TextBox"/>
+          <p:cNvSpPr txBox="1">
+            <a:spLocks noGrp="1" noSelect="1" noRot="1" noMove="1"/>
+          </p:cNvSpPr>
+          <p:nvPr/>
+        </p:nvSpPr>
+        <p:spPr>
+          <a:xfrm>
+            <a:off x="2890520" y="2644140"/>
+            <a:ext cx="6411372" cy="1569660"/>
+          </a:xfrm>
+          <a:prstGeom prst="rect">
+            <a:avLst/>
+          </a:prstGeom>
+          <a:noFill/>
+        </p:spPr>
+        <p:txBody>
+          <a:bodyPr wrap="none" rtlCol="0" anchor="ctr" anchorCtr="1">
+            <a:spAutoFit/>
+          </a:bodyPr>
+          <a:lstStyle>
+            <a:lvl1pPr algn="l">
+              <a:lnSpc>
+                <a:spcPct val="150000"/>
+              </a:lnSpc>
+              <a:spcBef>
+                <a:spcPct val="0"/>
+              </a:spcBef>
+              <a:spcAft>
+                <a:spcPct val="0"/>
+              </a:spcAft>
+              <a:defRPr lang="en-US" sz="3200" b="1" noProof="1" dirty="0">
+                <a:solidFill>
+                  <a:prstClr val="red">
+                    <a:lumOff val="30000"/>
+                    <a:alpha val="40000"/>
+                  </a:prstClr>
+                </a:solidFill>
+                <a:effectLst>
+                  <a:outerShdw blurRad="50800" dist="38100" algn="tr" rotWithShape="0">
+                    <a:prstClr val="black">
+                      <a:alpha val="80000"/>
+                    </a:prstClr>
+                  </a:outerShdw>
+                </a:effectLst>
+                <a:latin typeface="Calibri" pitchFamily="34" charset="0"/>
+              </a:defRPr>
+            </a:lvl1pPr>
+          </a:lstStyle>
+          <a:p>
+            <a:pPr algn="ctr"/>
+            <a:r>
+              <a:t>Evaluation only.</a:t>
+            </a:r>
+          </a:p>
+          <a:p>
+            <a:pPr algn="ctr"/>
+            <a:r>
+              <a:t>Created with Aspose.Slides for Java 23.6.</a:t>
+            </a:r>
+          </a:p>
+          <a:p>
+            <a:pPr algn="ctr"/>
+            <a:r>
+              <a:t>Copyright 2004-2023 Aspose Pty Ltd.</a:t>
+            </a:r>
+          </a:p>
+        </p:txBody>
+      </p:sp>
     </p:spTree>
     <p:extLst>
       <p:ext uri="{BB962C8B-B14F-4D97-AF65-F5344CB8AC3E}">
@@ -12282,6 +12921,18 @@
                           <a:cs typeface="Batang"/>
                         </a:rPr>
                         <a:t>제품 설명</a:t>
+                      </a:r>
+                      <a:r>
+                        <a:rPr lang="ko-KR" sz="1400" b="0" i="0" strike="noStrike" cap="none" baseline="0">
+                          <a:solidFill>
+                            <a:srgbClr val="FFFFFF"/>
+                          </a:solidFill>
+                          <a:effectLst/>
+                          <a:latin typeface="Batang"/>
+                          <a:ea typeface="Batang"/>
+                          <a:cs typeface="Batang"/>
+                        </a:rPr>
+                        <a:t>:</a:t>
                       </a:r>
                       <a:endParaRPr lang="en-US" sz="2300">
                         <a:effectLst/>
@@ -12531,6 +13182,77 @@
           </a:graphicData>
         </a:graphic>
       </p:graphicFrame>
+      <p:sp>
+        <p:nvSpPr>
+          <p:cNvPr id="15" name="TextBox"/>
+          <p:cNvSpPr txBox="1">
+            <a:spLocks noGrp="1" noSelect="1" noRot="1" noMove="1"/>
+          </p:cNvSpPr>
+          <p:nvPr/>
+        </p:nvSpPr>
+        <p:spPr>
+          <a:xfrm>
+            <a:off x="2890520" y="2644140"/>
+            <a:ext cx="6411372" cy="1569660"/>
+          </a:xfrm>
+          <a:prstGeom prst="rect">
+            <a:avLst/>
+          </a:prstGeom>
+          <a:noFill/>
+        </p:spPr>
+        <p:txBody>
+          <a:bodyPr wrap="none" rtlCol="0" anchor="ctr" anchorCtr="1">
+            <a:spAutoFit/>
+          </a:bodyPr>
+          <a:lstStyle>
+            <a:lvl1pPr algn="l">
+              <a:lnSpc>
+                <a:spcPct val="150000"/>
+              </a:lnSpc>
+              <a:spcBef>
+                <a:spcPct val="0"/>
+              </a:spcBef>
+              <a:spcAft>
+                <a:spcPct val="0"/>
+              </a:spcAft>
+              <a:defRPr lang="en-US" sz="3200" b="1" noProof="1" dirty="0">
+                <a:solidFill>
+                  <a:prstClr val="red">
+                    <a:lumOff val="30000"/>
+                    <a:alpha val="40000"/>
+                  </a:prstClr>
+                </a:solidFill>
+                <a:effectLst>
+                  <a:outerShdw blurRad="50800" dist="38100" algn="tr" rotWithShape="0">
+                    <a:prstClr val="black">
+                      <a:alpha val="80000"/>
+                    </a:prstClr>
+                  </a:outerShdw>
+                </a:effectLst>
+                <a:latin typeface="Calibri" pitchFamily="34" charset="0"/>
+              </a:defRPr>
+            </a:lvl1pPr>
+          </a:lstStyle>
+          <a:p>
+            <a:pPr algn="ctr"/>
+            <a:r>
+              <a:t>Evaluation only.</a:t>
+            </a:r>
+          </a:p>
+          <a:p>
+            <a:pPr algn="ctr"/>
+            <a:r>
+              <a:t>Created with Aspose.Slides for Java 23.6.</a:t>
+            </a:r>
+          </a:p>
+          <a:p>
+            <a:pPr algn="ctr"/>
+            <a:r>
+              <a:t>Copyright 2004-2023 Aspose Pty Ltd.</a:t>
+            </a:r>
+          </a:p>
+        </p:txBody>
+      </p:sp>
     </p:spTree>
     <p:extLst>
       <p:ext uri="{BB962C8B-B14F-4D97-AF65-F5344CB8AC3E}">
@@ -12926,7 +13648,7 @@
         </p:nvGraphicFramePr>
         <p:xfrm>
           <a:off x="5282335" y="1994843"/>
-          <a:ext cx="6275668" cy="2868317"/>
+          <a:ext cx="6275668" cy="3022602"/>
         </p:xfrm>
         <a:graphic>
           <a:graphicData uri="http://schemas.openxmlformats.org/drawingml/2006/table">
@@ -13125,7 +13847,7 @@
                           <a:ea typeface="Batang"/>
                           <a:cs typeface="Batang"/>
                         </a:rPr>
-                        <a:t>지속 가능한 공급: 저희는 지속 가능성을 위해 최선을 다하고 있으며, 유기농 농업을 실천하는 소규모 농장에서 재료를 공급함으로써 최고의 품질뿐만 아니라 지구의 건강에도 이바지하고 있습니다.</a:t>
+                        <a:t>지속 가능한 소싱: 저희는 지속 가능성을 위해 최선을 다하고 있으며, 유기농 농업을 실천하는 소규모 농장에서 재료를 공급받음으로써 최고의 품질뿐만 아니라 지구의 건강에도 이바지하고 있습니다.</a:t>
                       </a:r>
                       <a:endParaRPr lang="en-US" sz="1700">
                         <a:effectLst/>
@@ -13250,6 +13972,77 @@
           </a:graphicData>
         </a:graphic>
       </p:graphicFrame>
+      <p:sp>
+        <p:nvSpPr>
+          <p:cNvPr id="19" name="TextBox"/>
+          <p:cNvSpPr txBox="1">
+            <a:spLocks noGrp="1" noSelect="1" noRot="1" noMove="1"/>
+          </p:cNvSpPr>
+          <p:nvPr/>
+        </p:nvSpPr>
+        <p:spPr>
+          <a:xfrm>
+            <a:off x="2890520" y="2644140"/>
+            <a:ext cx="6411372" cy="1569660"/>
+          </a:xfrm>
+          <a:prstGeom prst="rect">
+            <a:avLst/>
+          </a:prstGeom>
+          <a:noFill/>
+        </p:spPr>
+        <p:txBody>
+          <a:bodyPr wrap="none" rtlCol="0" anchor="ctr" anchorCtr="1">
+            <a:spAutoFit/>
+          </a:bodyPr>
+          <a:lstStyle>
+            <a:lvl1pPr algn="l">
+              <a:lnSpc>
+                <a:spcPct val="150000"/>
+              </a:lnSpc>
+              <a:spcBef>
+                <a:spcPct val="0"/>
+              </a:spcBef>
+              <a:spcAft>
+                <a:spcPct val="0"/>
+              </a:spcAft>
+              <a:defRPr lang="en-US" sz="3200" b="1" noProof="1" dirty="0">
+                <a:solidFill>
+                  <a:prstClr val="red">
+                    <a:lumOff val="30000"/>
+                    <a:alpha val="40000"/>
+                  </a:prstClr>
+                </a:solidFill>
+                <a:effectLst>
+                  <a:outerShdw blurRad="50800" dist="38100" algn="tr" rotWithShape="0">
+                    <a:prstClr val="black">
+                      <a:alpha val="80000"/>
+                    </a:prstClr>
+                  </a:outerShdw>
+                </a:effectLst>
+                <a:latin typeface="Calibri" pitchFamily="34" charset="0"/>
+              </a:defRPr>
+            </a:lvl1pPr>
+          </a:lstStyle>
+          <a:p>
+            <a:pPr algn="ctr"/>
+            <a:r>
+              <a:t>Evaluation only.</a:t>
+            </a:r>
+          </a:p>
+          <a:p>
+            <a:pPr algn="ctr"/>
+            <a:r>
+              <a:t>Created with Aspose.Slides for Java 23.6.</a:t>
+            </a:r>
+          </a:p>
+          <a:p>
+            <a:pPr algn="ctr"/>
+            <a:r>
+              <a:t>Copyright 2004-2023 Aspose Pty Ltd.</a:t>
+            </a:r>
+          </a:p>
+        </p:txBody>
+      </p:sp>
     </p:spTree>
     <p:extLst>
       <p:ext uri="{BB962C8B-B14F-4D97-AF65-F5344CB8AC3E}">
@@ -14261,6 +15054,77 @@
           </a:graphicData>
         </a:graphic>
       </p:graphicFrame>
+      <p:sp>
+        <p:nvSpPr>
+          <p:cNvPr id="20" name="TextBox"/>
+          <p:cNvSpPr txBox="1">
+            <a:spLocks noGrp="1" noSelect="1" noRot="1" noMove="1"/>
+          </p:cNvSpPr>
+          <p:nvPr/>
+        </p:nvSpPr>
+        <p:spPr>
+          <a:xfrm>
+            <a:off x="2890520" y="2644140"/>
+            <a:ext cx="6411372" cy="1569660"/>
+          </a:xfrm>
+          <a:prstGeom prst="rect">
+            <a:avLst/>
+          </a:prstGeom>
+          <a:noFill/>
+        </p:spPr>
+        <p:txBody>
+          <a:bodyPr wrap="none" rtlCol="0" anchor="ctr" anchorCtr="1">
+            <a:spAutoFit/>
+          </a:bodyPr>
+          <a:lstStyle>
+            <a:lvl1pPr algn="l">
+              <a:lnSpc>
+                <a:spcPct val="150000"/>
+              </a:lnSpc>
+              <a:spcBef>
+                <a:spcPct val="0"/>
+              </a:spcBef>
+              <a:spcAft>
+                <a:spcPct val="0"/>
+              </a:spcAft>
+              <a:defRPr lang="en-US" sz="3200" b="1" noProof="1" dirty="0">
+                <a:solidFill>
+                  <a:prstClr val="red">
+                    <a:lumOff val="30000"/>
+                    <a:alpha val="40000"/>
+                  </a:prstClr>
+                </a:solidFill>
+                <a:effectLst>
+                  <a:outerShdw blurRad="50800" dist="38100" algn="tr" rotWithShape="0">
+                    <a:prstClr val="black">
+                      <a:alpha val="80000"/>
+                    </a:prstClr>
+                  </a:outerShdw>
+                </a:effectLst>
+                <a:latin typeface="Calibri" pitchFamily="34" charset="0"/>
+              </a:defRPr>
+            </a:lvl1pPr>
+          </a:lstStyle>
+          <a:p>
+            <a:pPr algn="ctr"/>
+            <a:r>
+              <a:t>Evaluation only.</a:t>
+            </a:r>
+          </a:p>
+          <a:p>
+            <a:pPr algn="ctr"/>
+            <a:r>
+              <a:t>Created with Aspose.Slides for Java 23.6.</a:t>
+            </a:r>
+          </a:p>
+          <a:p>
+            <a:pPr algn="ctr"/>
+            <a:r>
+              <a:t>Copyright 2004-2023 Aspose Pty Ltd.</a:t>
+            </a:r>
+          </a:p>
+        </p:txBody>
+      </p:sp>
     </p:spTree>
     <p:extLst>
       <p:ext uri="{BB962C8B-B14F-4D97-AF65-F5344CB8AC3E}">
@@ -14595,6 +15459,77 @@
           </a:p>
         </p:txBody>
       </p:sp>
+      <p:sp>
+        <p:nvSpPr>
+          <p:cNvPr id="11" name="TextBox"/>
+          <p:cNvSpPr txBox="1">
+            <a:spLocks noGrp="1" noSelect="1" noRot="1" noMove="1"/>
+          </p:cNvSpPr>
+          <p:nvPr/>
+        </p:nvSpPr>
+        <p:spPr>
+          <a:xfrm>
+            <a:off x="2890520" y="2644140"/>
+            <a:ext cx="6411372" cy="1569660"/>
+          </a:xfrm>
+          <a:prstGeom prst="rect">
+            <a:avLst/>
+          </a:prstGeom>
+          <a:noFill/>
+        </p:spPr>
+        <p:txBody>
+          <a:bodyPr wrap="none" rtlCol="0" anchor="ctr" anchorCtr="1">
+            <a:spAutoFit/>
+          </a:bodyPr>
+          <a:lstStyle>
+            <a:lvl1pPr algn="l">
+              <a:lnSpc>
+                <a:spcPct val="150000"/>
+              </a:lnSpc>
+              <a:spcBef>
+                <a:spcPct val="0"/>
+              </a:spcBef>
+              <a:spcAft>
+                <a:spcPct val="0"/>
+              </a:spcAft>
+              <a:defRPr lang="en-US" sz="3200" b="1" noProof="1" dirty="0">
+                <a:solidFill>
+                  <a:prstClr val="red">
+                    <a:lumOff val="30000"/>
+                    <a:alpha val="40000"/>
+                  </a:prstClr>
+                </a:solidFill>
+                <a:effectLst>
+                  <a:outerShdw blurRad="50800" dist="38100" algn="tr" rotWithShape="0">
+                    <a:prstClr val="black">
+                      <a:alpha val="80000"/>
+                    </a:prstClr>
+                  </a:outerShdw>
+                </a:effectLst>
+                <a:latin typeface="Calibri" pitchFamily="34" charset="0"/>
+              </a:defRPr>
+            </a:lvl1pPr>
+          </a:lstStyle>
+          <a:p>
+            <a:pPr algn="ctr"/>
+            <a:r>
+              <a:t>Evaluation only.</a:t>
+            </a:r>
+          </a:p>
+          <a:p>
+            <a:pPr algn="ctr"/>
+            <a:r>
+              <a:t>Created with Aspose.Slides for Java 23.6.</a:t>
+            </a:r>
+          </a:p>
+          <a:p>
+            <a:pPr algn="ctr"/>
+            <a:r>
+              <a:t>Copyright 2004-2023 Aspose Pty Ltd.</a:t>
+            </a:r>
+          </a:p>
+        </p:txBody>
+      </p:sp>
     </p:spTree>
     <p:extLst>
       <p:ext uri="{BB962C8B-B14F-4D97-AF65-F5344CB8AC3E}">
@@ -14899,6 +15834,77 @@
           </a:p>
         </p:txBody>
       </p:sp>
+      <p:sp>
+        <p:nvSpPr>
+          <p:cNvPr id="11" name="TextBox"/>
+          <p:cNvSpPr txBox="1">
+            <a:spLocks noGrp="1" noSelect="1" noRot="1" noMove="1"/>
+          </p:cNvSpPr>
+          <p:nvPr/>
+        </p:nvSpPr>
+        <p:spPr>
+          <a:xfrm>
+            <a:off x="2890520" y="2644140"/>
+            <a:ext cx="6411372" cy="1569660"/>
+          </a:xfrm>
+          <a:prstGeom prst="rect">
+            <a:avLst/>
+          </a:prstGeom>
+          <a:noFill/>
+        </p:spPr>
+        <p:txBody>
+          <a:bodyPr wrap="none" rtlCol="0" anchor="ctr" anchorCtr="1">
+            <a:spAutoFit/>
+          </a:bodyPr>
+          <a:lstStyle>
+            <a:lvl1pPr algn="l">
+              <a:lnSpc>
+                <a:spcPct val="150000"/>
+              </a:lnSpc>
+              <a:spcBef>
+                <a:spcPct val="0"/>
+              </a:spcBef>
+              <a:spcAft>
+                <a:spcPct val="0"/>
+              </a:spcAft>
+              <a:defRPr lang="en-US" sz="3200" b="1" noProof="1" dirty="0">
+                <a:solidFill>
+                  <a:prstClr val="red">
+                    <a:lumOff val="30000"/>
+                    <a:alpha val="40000"/>
+                  </a:prstClr>
+                </a:solidFill>
+                <a:effectLst>
+                  <a:outerShdw blurRad="50800" dist="38100" algn="tr" rotWithShape="0">
+                    <a:prstClr val="black">
+                      <a:alpha val="80000"/>
+                    </a:prstClr>
+                  </a:outerShdw>
+                </a:effectLst>
+                <a:latin typeface="Calibri" pitchFamily="34" charset="0"/>
+              </a:defRPr>
+            </a:lvl1pPr>
+          </a:lstStyle>
+          <a:p>
+            <a:pPr algn="ctr"/>
+            <a:r>
+              <a:t>Evaluation only.</a:t>
+            </a:r>
+          </a:p>
+          <a:p>
+            <a:pPr algn="ctr"/>
+            <a:r>
+              <a:t>Created with Aspose.Slides for Java 23.6.</a:t>
+            </a:r>
+          </a:p>
+          <a:p>
+            <a:pPr algn="ctr"/>
+            <a:r>
+              <a:t>Copyright 2004-2023 Aspose Pty Ltd.</a:t>
+            </a:r>
+          </a:p>
+        </p:txBody>
+      </p:sp>
     </p:spTree>
     <p:extLst>
       <p:ext uri="{BB962C8B-B14F-4D97-AF65-F5344CB8AC3E}">
@@ -14916,10 +15922,10 @@
 
 <file path=ppt/tags/tag1.xml><?xml version="1.0" encoding="utf-8"?>
 <p:tagLst xmlns:p="http://schemas.openxmlformats.org/presentationml/2006/main">
-  <p:tag name="AS_OS" val="Unix 3.10.0.1160"/>
+  <p:tag name="AS_OS" val="Microsoft Windows NT 10.0"/>
   <p:tag name="AS_RELEASE_DATE" val="2023.06.30"/>
   <p:tag name="AS_TITLE" val="Aspose.Slides for Java"/>
-  <p:tag name="AS_VERSION" val="23.6.1"/>
+  <p:tag name="AS_VERSION" val="23.6"/>
 </p:tagLst>
 </file>
 

</xml_diff>